<commit_message>
DeveloperGuide.adoc: Update Model UML diagram
</commit_message>
<xml_diff>
--- a/docs/diagrams/ModelComponentClassDiagram.pptx
+++ b/docs/diagrams/ModelComponentClassDiagram.pptx
@@ -208,7 +208,7 @@
           <a:p>
             <a:fld id="{F5CC4B3F-88C1-4FFA-B1B6-F41C21DC6924}" type="datetimeFigureOut">
               <a:rPr lang="en-US" smtClean="0"/>
-              <a:t>6/27/2018</a:t>
+              <a:t>10/31/18</a:t>
             </a:fld>
             <a:endParaRPr lang="en-US"/>
           </a:p>
@@ -475,6 +475,90 @@
 </p:notesMaster>
 </file>
 
+<file path=ppt/notesSlides/notesSlide1.xml><?xml version="1.0" encoding="utf-8"?>
+<p:notes xmlns:a="http://schemas.openxmlformats.org/drawingml/2006/main" xmlns:r="http://schemas.openxmlformats.org/officeDocument/2006/relationships" xmlns:p="http://schemas.openxmlformats.org/presentationml/2006/main">
+  <p:cSld>
+    <p:spTree>
+      <p:nvGrpSpPr>
+        <p:cNvPr id="1" name=""/>
+        <p:cNvGrpSpPr/>
+        <p:nvPr/>
+      </p:nvGrpSpPr>
+      <p:grpSpPr>
+        <a:xfrm>
+          <a:off x="0" y="0"/>
+          <a:ext cx="0" cy="0"/>
+          <a:chOff x="0" y="0"/>
+          <a:chExt cx="0" cy="0"/>
+        </a:xfrm>
+      </p:grpSpPr>
+      <p:sp>
+        <p:nvSpPr>
+          <p:cNvPr id="2" name="Slide Image Placeholder 1"/>
+          <p:cNvSpPr>
+            <a:spLocks noGrp="1" noRot="1" noChangeAspect="1"/>
+          </p:cNvSpPr>
+          <p:nvPr>
+            <p:ph type="sldImg"/>
+          </p:nvPr>
+        </p:nvSpPr>
+        <p:spPr/>
+      </p:sp>
+      <p:sp>
+        <p:nvSpPr>
+          <p:cNvPr id="3" name="Notes Placeholder 2"/>
+          <p:cNvSpPr>
+            <a:spLocks noGrp="1"/>
+          </p:cNvSpPr>
+          <p:nvPr>
+            <p:ph type="body" idx="1"/>
+          </p:nvPr>
+        </p:nvSpPr>
+        <p:spPr/>
+        <p:txBody>
+          <a:bodyPr/>
+          <a:lstStyle/>
+          <a:p>
+            <a:endParaRPr lang="en-US" dirty="0"/>
+          </a:p>
+        </p:txBody>
+      </p:sp>
+      <p:sp>
+        <p:nvSpPr>
+          <p:cNvPr id="4" name="Slide Number Placeholder 3"/>
+          <p:cNvSpPr>
+            <a:spLocks noGrp="1"/>
+          </p:cNvSpPr>
+          <p:nvPr>
+            <p:ph type="sldNum" sz="quarter" idx="10"/>
+          </p:nvPr>
+        </p:nvSpPr>
+        <p:spPr/>
+        <p:txBody>
+          <a:bodyPr/>
+          <a:lstStyle/>
+          <a:p>
+            <a:fld id="{5A7AB025-77E3-4BD1-A2FD-B3183DBA47A3}" type="slidenum">
+              <a:rPr lang="en-US" smtClean="0"/>
+              <a:t>1</a:t>
+            </a:fld>
+            <a:endParaRPr lang="en-US"/>
+          </a:p>
+        </p:txBody>
+      </p:sp>
+    </p:spTree>
+    <p:extLst>
+      <p:ext uri="{BB962C8B-B14F-4D97-AF65-F5344CB8AC3E}">
+        <p14:creationId xmlns:p14="http://schemas.microsoft.com/office/powerpoint/2010/main" val="953489920"/>
+      </p:ext>
+    </p:extLst>
+  </p:cSld>
+  <p:clrMapOvr>
+    <a:masterClrMapping/>
+  </p:clrMapOvr>
+</p:notes>
+</file>
+
 <file path=ppt/slideLayouts/slideLayout1.xml><?xml version="1.0" encoding="utf-8"?>
 <p:sldLayout xmlns:a="http://schemas.openxmlformats.org/drawingml/2006/main" xmlns:r="http://schemas.openxmlformats.org/officeDocument/2006/relationships" xmlns:p="http://schemas.openxmlformats.org/presentationml/2006/main" type="title" preserve="1">
   <p:cSld name="Title Slide">
@@ -654,7 +738,7 @@
           <a:p>
             <a:fld id="{78C97017-6FC3-485B-9764-EAC9E56C1D49}" type="datetimeFigureOut">
               <a:rPr lang="en-US" smtClean="0"/>
-              <a:t>6/27/2018</a:t>
+              <a:t>10/31/18</a:t>
             </a:fld>
             <a:endParaRPr lang="en-US"/>
           </a:p>
@@ -822,7 +906,7 @@
           <a:p>
             <a:fld id="{78C97017-6FC3-485B-9764-EAC9E56C1D49}" type="datetimeFigureOut">
               <a:rPr lang="en-US" smtClean="0"/>
-              <a:t>6/27/2018</a:t>
+              <a:t>10/31/18</a:t>
             </a:fld>
             <a:endParaRPr lang="en-US"/>
           </a:p>
@@ -1000,7 +1084,7 @@
           <a:p>
             <a:fld id="{78C97017-6FC3-485B-9764-EAC9E56C1D49}" type="datetimeFigureOut">
               <a:rPr lang="en-US" smtClean="0"/>
-              <a:t>6/27/2018</a:t>
+              <a:t>10/31/18</a:t>
             </a:fld>
             <a:endParaRPr lang="en-US"/>
           </a:p>
@@ -1168,7 +1252,7 @@
           <a:p>
             <a:fld id="{78C97017-6FC3-485B-9764-EAC9E56C1D49}" type="datetimeFigureOut">
               <a:rPr lang="en-US" smtClean="0"/>
-              <a:t>6/27/2018</a:t>
+              <a:t>10/31/18</a:t>
             </a:fld>
             <a:endParaRPr lang="en-US"/>
           </a:p>
@@ -1413,7 +1497,7 @@
           <a:p>
             <a:fld id="{78C97017-6FC3-485B-9764-EAC9E56C1D49}" type="datetimeFigureOut">
               <a:rPr lang="en-US" smtClean="0"/>
-              <a:t>6/27/2018</a:t>
+              <a:t>10/31/18</a:t>
             </a:fld>
             <a:endParaRPr lang="en-US"/>
           </a:p>
@@ -1698,7 +1782,7 @@
           <a:p>
             <a:fld id="{78C97017-6FC3-485B-9764-EAC9E56C1D49}" type="datetimeFigureOut">
               <a:rPr lang="en-US" smtClean="0"/>
-              <a:t>6/27/2018</a:t>
+              <a:t>10/31/18</a:t>
             </a:fld>
             <a:endParaRPr lang="en-US"/>
           </a:p>
@@ -2117,7 +2201,7 @@
           <a:p>
             <a:fld id="{78C97017-6FC3-485B-9764-EAC9E56C1D49}" type="datetimeFigureOut">
               <a:rPr lang="en-US" smtClean="0"/>
-              <a:t>6/27/2018</a:t>
+              <a:t>10/31/18</a:t>
             </a:fld>
             <a:endParaRPr lang="en-US"/>
           </a:p>
@@ -2234,7 +2318,7 @@
           <a:p>
             <a:fld id="{78C97017-6FC3-485B-9764-EAC9E56C1D49}" type="datetimeFigureOut">
               <a:rPr lang="en-US" smtClean="0"/>
-              <a:t>6/27/2018</a:t>
+              <a:t>10/31/18</a:t>
             </a:fld>
             <a:endParaRPr lang="en-US"/>
           </a:p>
@@ -2329,7 +2413,7 @@
           <a:p>
             <a:fld id="{78C97017-6FC3-485B-9764-EAC9E56C1D49}" type="datetimeFigureOut">
               <a:rPr lang="en-US" smtClean="0"/>
-              <a:t>6/27/2018</a:t>
+              <a:t>10/31/18</a:t>
             </a:fld>
             <a:endParaRPr lang="en-US"/>
           </a:p>
@@ -2604,7 +2688,7 @@
           <a:p>
             <a:fld id="{78C97017-6FC3-485B-9764-EAC9E56C1D49}" type="datetimeFigureOut">
               <a:rPr lang="en-US" smtClean="0"/>
-              <a:t>6/27/2018</a:t>
+              <a:t>10/31/18</a:t>
             </a:fld>
             <a:endParaRPr lang="en-US"/>
           </a:p>
@@ -2856,7 +2940,7 @@
           <a:p>
             <a:fld id="{78C97017-6FC3-485B-9764-EAC9E56C1D49}" type="datetimeFigureOut">
               <a:rPr lang="en-US" smtClean="0"/>
-              <a:t>6/27/2018</a:t>
+              <a:t>10/31/18</a:t>
             </a:fld>
             <a:endParaRPr lang="en-US"/>
           </a:p>
@@ -3067,7 +3151,7 @@
           <a:p>
             <a:fld id="{78C97017-6FC3-485B-9764-EAC9E56C1D49}" type="datetimeFigureOut">
               <a:rPr lang="en-US" smtClean="0"/>
-              <a:t>6/27/2018</a:t>
+              <a:t>10/31/18</a:t>
             </a:fld>
             <a:endParaRPr lang="en-US"/>
           </a:p>
@@ -3450,8 +3534,8 @@
         </p:nvSpPr>
         <p:spPr>
           <a:xfrm>
-            <a:off x="1119865" y="1600200"/>
-            <a:ext cx="7490735" cy="3124200"/>
+            <a:off x="304800" y="24646"/>
+            <a:ext cx="8541261" cy="6705600"/>
           </a:xfrm>
           <a:prstGeom prst="roundRect">
             <a:avLst>
@@ -3511,7 +3595,7 @@
         </p:nvSpPr>
         <p:spPr>
           <a:xfrm>
-            <a:off x="2877180" y="3463240"/>
+            <a:off x="2020635" y="4569836"/>
             <a:ext cx="1093635" cy="346760"/>
           </a:xfrm>
           <a:prstGeom prst="rect">
@@ -3570,8 +3654,8 @@
         </p:nvSpPr>
         <p:spPr>
           <a:xfrm rot="16200000">
-            <a:off x="1661548" y="3097750"/>
-            <a:ext cx="1093635" cy="346760"/>
+            <a:off x="-892893" y="3343591"/>
+            <a:ext cx="4548458" cy="346760"/>
           </a:xfrm>
           <a:prstGeom prst="rect">
             <a:avLst/>
@@ -3626,20 +3710,17 @@
           <p:cNvPr id="107" name="Elbow Connector 106"/>
           <p:cNvCxnSpPr>
             <a:cxnSpLocks/>
-            <a:stCxn id="9" idx="1"/>
             <a:endCxn id="62" idx="2"/>
           </p:cNvCxnSpPr>
           <p:nvPr/>
         </p:nvCxnSpPr>
         <p:spPr>
-          <a:xfrm rot="5400000" flipH="1" flipV="1">
-            <a:off x="4131507" y="1281685"/>
-            <a:ext cx="613122" cy="4459404"/>
-          </a:xfrm>
-          <a:prstGeom prst="bentConnector3">
-            <a:avLst>
-              <a:gd name="adj1" fmla="val -26668"/>
-            </a:avLst>
+          <a:xfrm flipV="1">
+            <a:off x="1561282" y="1723256"/>
+            <a:ext cx="4279458" cy="178683"/>
+          </a:xfrm>
+          <a:prstGeom prst="bentConnector2">
+            <a:avLst/>
           </a:prstGeom>
           <a:ln w="19050">
             <a:solidFill>
@@ -3674,7 +3755,7 @@
         </p:nvSpPr>
         <p:spPr>
           <a:xfrm rot="16200000">
-            <a:off x="956202" y="2861202"/>
+            <a:off x="129172" y="1379632"/>
             <a:ext cx="1093635" cy="346760"/>
           </a:xfrm>
           <a:prstGeom prst="rect">
@@ -3744,7 +3825,7 @@
         </p:nvSpPr>
         <p:spPr>
           <a:xfrm rot="16200000">
-            <a:off x="1626910" y="2952291"/>
+            <a:off x="799880" y="1470721"/>
             <a:ext cx="270504" cy="175523"/>
           </a:xfrm>
           <a:prstGeom prst="triangle">
@@ -3785,54 +3866,13 @@
       </p:sp>
       <p:cxnSp>
         <p:nvCxnSpPr>
-          <p:cNvPr id="58" name="Straight Arrow Connector 57"/>
-          <p:cNvCxnSpPr>
-            <a:stCxn id="42" idx="3"/>
-            <a:endCxn id="2" idx="1"/>
-          </p:cNvCxnSpPr>
-          <p:nvPr/>
-        </p:nvCxnSpPr>
-        <p:spPr>
-          <a:xfrm>
-            <a:off x="2609828" y="3636620"/>
-            <a:ext cx="267352" cy="0"/>
-          </a:xfrm>
-          <a:prstGeom prst="straightConnector1">
-            <a:avLst/>
-          </a:prstGeom>
-          <a:ln w="19050">
-            <a:solidFill>
-              <a:srgbClr val="7030A0"/>
-            </a:solidFill>
-            <a:headEnd type="none" w="med" len="med"/>
-            <a:tailEnd type="arrow" w="med" len="med"/>
-          </a:ln>
-          <a:effectLst/>
-        </p:spPr>
-        <p:style>
-          <a:lnRef idx="1">
-            <a:schemeClr val="accent2"/>
-          </a:lnRef>
-          <a:fillRef idx="2">
-            <a:schemeClr val="accent2"/>
-          </a:fillRef>
-          <a:effectRef idx="1">
-            <a:schemeClr val="accent2"/>
-          </a:effectRef>
-          <a:fontRef idx="minor">
-            <a:schemeClr val="dk1"/>
-          </a:fontRef>
-        </p:style>
-      </p:cxnSp>
-      <p:cxnSp>
-        <p:nvCxnSpPr>
           <p:cNvPr id="75" name="Elbow Connector 122"/>
           <p:cNvCxnSpPr/>
           <p:nvPr/>
         </p:nvCxnSpPr>
         <p:spPr>
           <a:xfrm>
-            <a:off x="910091" y="3040053"/>
+            <a:off x="83061" y="1558483"/>
             <a:ext cx="419548" cy="2860"/>
           </a:xfrm>
           <a:prstGeom prst="bentConnector3">
@@ -3877,7 +3917,7 @@
         </p:nvCxnSpPr>
         <p:spPr>
           <a:xfrm flipV="1">
-            <a:off x="1849924" y="3040052"/>
+            <a:off x="1022894" y="1558482"/>
             <a:ext cx="216105" cy="1"/>
           </a:xfrm>
           <a:prstGeom prst="line">
@@ -3908,15 +3948,213 @@
           </a:fontRef>
         </p:style>
       </p:cxnSp>
-      <p:sp>
-        <p:nvSpPr>
-          <p:cNvPr id="42" name="Flowchart: Decision 96"/>
+      <p:grpSp>
+        <p:nvGrpSpPr>
+          <p:cNvPr id="146" name="Group 145"/>
+          <p:cNvGrpSpPr/>
+          <p:nvPr/>
+        </p:nvGrpSpPr>
+        <p:grpSpPr>
+          <a:xfrm>
+            <a:off x="1571457" y="4656526"/>
+            <a:ext cx="449178" cy="173380"/>
+            <a:chOff x="1463689" y="3549930"/>
+            <a:chExt cx="449178" cy="173380"/>
+          </a:xfrm>
+        </p:grpSpPr>
+        <p:cxnSp>
+          <p:nvCxnSpPr>
+            <p:cNvPr id="58" name="Straight Arrow Connector 57"/>
+            <p:cNvCxnSpPr>
+              <a:stCxn id="42" idx="3"/>
+              <a:endCxn id="2" idx="1"/>
+            </p:cNvCxnSpPr>
+            <p:nvPr/>
+          </p:nvCxnSpPr>
+          <p:spPr>
+            <a:xfrm>
+              <a:off x="1699737" y="3636620"/>
+              <a:ext cx="213130" cy="0"/>
+            </a:xfrm>
+            <a:prstGeom prst="straightConnector1">
+              <a:avLst/>
+            </a:prstGeom>
+            <a:ln w="19050">
+              <a:solidFill>
+                <a:srgbClr val="7030A0"/>
+              </a:solidFill>
+              <a:headEnd type="none" w="med" len="med"/>
+              <a:tailEnd type="arrow" w="med" len="med"/>
+            </a:ln>
+            <a:effectLst/>
+          </p:spPr>
+          <p:style>
+            <a:lnRef idx="1">
+              <a:schemeClr val="accent2"/>
+            </a:lnRef>
+            <a:fillRef idx="2">
+              <a:schemeClr val="accent2"/>
+            </a:fillRef>
+            <a:effectRef idx="1">
+              <a:schemeClr val="accent2"/>
+            </a:effectRef>
+            <a:fontRef idx="minor">
+              <a:schemeClr val="dk1"/>
+            </a:fontRef>
+          </p:style>
+        </p:cxnSp>
+        <p:sp>
+          <p:nvSpPr>
+            <p:cNvPr id="42" name="Flowchart: Decision 96"/>
+            <p:cNvSpPr/>
+            <p:nvPr/>
+          </p:nvSpPr>
+          <p:spPr>
+            <a:xfrm>
+              <a:off x="1463689" y="3549930"/>
+              <a:ext cx="236048" cy="173380"/>
+            </a:xfrm>
+            <a:prstGeom prst="flowChartDecision">
+              <a:avLst/>
+            </a:prstGeom>
+            <a:noFill/>
+            <a:ln w="19050">
+              <a:solidFill>
+                <a:srgbClr val="7030A0"/>
+              </a:solidFill>
+            </a:ln>
+            <a:effectLst/>
+          </p:spPr>
+          <p:style>
+            <a:lnRef idx="1">
+              <a:schemeClr val="accent6"/>
+            </a:lnRef>
+            <a:fillRef idx="2">
+              <a:schemeClr val="accent6"/>
+            </a:fillRef>
+            <a:effectRef idx="1">
+              <a:schemeClr val="accent6"/>
+            </a:effectRef>
+            <a:fontRef idx="minor">
+              <a:schemeClr val="dk1"/>
+            </a:fontRef>
+          </p:style>
+          <p:txBody>
+            <a:bodyPr rtlCol="0" anchor="ctr"/>
+            <a:lstStyle/>
+            <a:p>
+              <a:pPr algn="ctr"/>
+              <a:endParaRPr lang="en-US" sz="1050"/>
+            </a:p>
+          </p:txBody>
+        </p:sp>
+      </p:grpSp>
+      <p:sp>
+        <p:nvSpPr>
+          <p:cNvPr id="46" name="Rectangle 8"/>
           <p:cNvSpPr/>
           <p:nvPr/>
         </p:nvSpPr>
         <p:spPr>
           <a:xfrm>
-            <a:off x="2373780" y="3549930"/>
+            <a:off x="1998250" y="1364592"/>
+            <a:ext cx="1490560" cy="334856"/>
+          </a:xfrm>
+          <a:prstGeom prst="rect">
+            <a:avLst/>
+          </a:prstGeom>
+          <a:ln w="19050">
+            <a:solidFill>
+              <a:srgbClr val="7030A0"/>
+            </a:solidFill>
+          </a:ln>
+          <a:effectLst/>
+        </p:spPr>
+        <p:style>
+          <a:lnRef idx="1">
+            <a:schemeClr val="accent4"/>
+          </a:lnRef>
+          <a:fillRef idx="2">
+            <a:schemeClr val="accent4"/>
+          </a:fillRef>
+          <a:effectRef idx="1">
+            <a:schemeClr val="accent4"/>
+          </a:effectRef>
+          <a:fontRef idx="minor">
+            <a:schemeClr val="dk1"/>
+          </a:fontRef>
+        </p:style>
+        <p:txBody>
+          <a:bodyPr rtlCol="0" anchor="ctr"/>
+          <a:lstStyle/>
+          <a:p>
+            <a:pPr algn="ctr"/>
+            <a:r>
+              <a:rPr lang="en-US" sz="1050" dirty="0" err="1" smtClean="0">
+                <a:solidFill>
+                  <a:srgbClr val="7030A0"/>
+                </a:solidFill>
+              </a:rPr>
+              <a:t>VersionedOrderBook</a:t>
+            </a:r>
+            <a:endParaRPr lang="en-SG" sz="1050" dirty="0">
+              <a:solidFill>
+                <a:srgbClr val="7030A0"/>
+              </a:solidFill>
+            </a:endParaRPr>
+          </a:p>
+        </p:txBody>
+      </p:sp>
+      <p:cxnSp>
+        <p:nvCxnSpPr>
+          <p:cNvPr id="47" name="Straight Arrow Connector 46"/>
+          <p:cNvCxnSpPr>
+            <a:stCxn id="48" idx="3"/>
+            <a:endCxn id="46" idx="1"/>
+          </p:cNvCxnSpPr>
+          <p:nvPr/>
+        </p:nvCxnSpPr>
+        <p:spPr>
+          <a:xfrm>
+            <a:off x="1797330" y="1521463"/>
+            <a:ext cx="200920" cy="10557"/>
+          </a:xfrm>
+          <a:prstGeom prst="straightConnector1">
+            <a:avLst/>
+          </a:prstGeom>
+          <a:ln w="19050">
+            <a:solidFill>
+              <a:srgbClr val="7030A0"/>
+            </a:solidFill>
+            <a:headEnd type="none" w="med" len="med"/>
+            <a:tailEnd type="arrow" w="med" len="med"/>
+          </a:ln>
+          <a:effectLst/>
+        </p:spPr>
+        <p:style>
+          <a:lnRef idx="1">
+            <a:schemeClr val="accent2"/>
+          </a:lnRef>
+          <a:fillRef idx="2">
+            <a:schemeClr val="accent2"/>
+          </a:fillRef>
+          <a:effectRef idx="1">
+            <a:schemeClr val="accent2"/>
+          </a:effectRef>
+          <a:fontRef idx="minor">
+            <a:schemeClr val="dk1"/>
+          </a:fontRef>
+        </p:style>
+      </p:cxnSp>
+      <p:sp>
+        <p:nvSpPr>
+          <p:cNvPr id="48" name="Flowchart: Decision 96"/>
+          <p:cNvSpPr/>
+          <p:nvPr/>
+        </p:nvSpPr>
+        <p:spPr>
+          <a:xfrm>
+            <a:off x="1561282" y="1434773"/>
             <a:ext cx="236048" cy="173380"/>
           </a:xfrm>
           <a:prstGeom prst="flowChartDecision">
@@ -3955,14 +4193,14 @@
       </p:sp>
       <p:sp>
         <p:nvSpPr>
-          <p:cNvPr id="46" name="Rectangle 8"/>
+          <p:cNvPr id="49" name="Rectangle 8"/>
           <p:cNvSpPr/>
           <p:nvPr/>
         </p:nvSpPr>
         <p:spPr>
           <a:xfrm>
-            <a:off x="2825280" y="2846162"/>
-            <a:ext cx="1490560" cy="334856"/>
+            <a:off x="3865620" y="1364592"/>
+            <a:ext cx="1156969" cy="346760"/>
           </a:xfrm>
           <a:prstGeom prst="rect">
             <a:avLst/>
@@ -3999,7 +4237,7 @@
                   <a:srgbClr val="7030A0"/>
                 </a:solidFill>
               </a:rPr>
-              <a:t>VersionedAddressBook</a:t>
+              <a:t>UniqueOrderList</a:t>
             </a:r>
             <a:endParaRPr lang="en-SG" sz="1050" dirty="0">
               <a:solidFill>
@@ -4009,62 +4247,23 @@
           </a:p>
         </p:txBody>
       </p:sp>
-      <p:cxnSp>
-        <p:nvCxnSpPr>
-          <p:cNvPr id="47" name="Straight Arrow Connector 46"/>
-          <p:cNvCxnSpPr>
-            <a:stCxn id="48" idx="3"/>
-            <a:endCxn id="46" idx="1"/>
-          </p:cNvCxnSpPr>
-          <p:nvPr/>
-        </p:nvCxnSpPr>
-        <p:spPr>
-          <a:xfrm>
-            <a:off x="2624360" y="3003033"/>
-            <a:ext cx="200920" cy="10557"/>
-          </a:xfrm>
-          <a:prstGeom prst="straightConnector1">
-            <a:avLst/>
-          </a:prstGeom>
-          <a:ln w="19050">
-            <a:solidFill>
-              <a:srgbClr val="7030A0"/>
-            </a:solidFill>
-            <a:headEnd type="none" w="med" len="med"/>
-            <a:tailEnd type="arrow" w="med" len="med"/>
-          </a:ln>
-          <a:effectLst/>
-        </p:spPr>
-        <p:style>
-          <a:lnRef idx="1">
-            <a:schemeClr val="accent2"/>
-          </a:lnRef>
-          <a:fillRef idx="2">
-            <a:schemeClr val="accent2"/>
-          </a:fillRef>
-          <a:effectRef idx="1">
-            <a:schemeClr val="accent2"/>
-          </a:effectRef>
-          <a:fontRef idx="minor">
-            <a:schemeClr val="dk1"/>
-          </a:fontRef>
-        </p:style>
-      </p:cxnSp>
-      <p:sp>
-        <p:nvSpPr>
-          <p:cNvPr id="48" name="Flowchart: Decision 96"/>
+      <p:sp>
+        <p:nvSpPr>
+          <p:cNvPr id="51" name="Flowchart: Decision 96"/>
           <p:cNvSpPr/>
           <p:nvPr/>
         </p:nvSpPr>
         <p:spPr>
           <a:xfrm>
-            <a:off x="2388312" y="2916343"/>
+            <a:off x="3497942" y="1438962"/>
             <a:ext cx="236048" cy="173380"/>
           </a:xfrm>
           <a:prstGeom prst="flowChartDecision">
             <a:avLst/>
           </a:prstGeom>
-          <a:noFill/>
+          <a:solidFill>
+            <a:srgbClr val="7030A0"/>
+          </a:solidFill>
           <a:ln w="19050">
             <a:solidFill>
               <a:srgbClr val="7030A0"/>
@@ -4097,14 +4296,14 @@
       </p:sp>
       <p:sp>
         <p:nvSpPr>
-          <p:cNvPr id="49" name="Rectangle 8"/>
+          <p:cNvPr id="62" name="Rectangle 8"/>
           <p:cNvSpPr/>
           <p:nvPr/>
         </p:nvSpPr>
         <p:spPr>
           <a:xfrm>
-            <a:off x="4692650" y="2846162"/>
-            <a:ext cx="1156969" cy="346760"/>
+            <a:off x="5486647" y="1376496"/>
+            <a:ext cx="708186" cy="346760"/>
           </a:xfrm>
           <a:prstGeom prst="rect">
             <a:avLst/>
@@ -4136,12 +4335,12 @@
           <a:p>
             <a:pPr algn="ctr"/>
             <a:r>
-              <a:rPr lang="en-US" sz="1050" dirty="0" err="1">
+              <a:rPr lang="en-US" sz="1050" dirty="0" smtClean="0">
                 <a:solidFill>
                   <a:srgbClr val="7030A0"/>
                 </a:solidFill>
               </a:rPr>
-              <a:t>UniquePersonList</a:t>
+              <a:t>Order</a:t>
             </a:r>
             <a:endParaRPr lang="en-SG" sz="1050" dirty="0">
               <a:solidFill>
@@ -4153,21 +4352,19 @@
       </p:sp>
       <p:sp>
         <p:nvSpPr>
-          <p:cNvPr id="51" name="Flowchart: Decision 96"/>
+          <p:cNvPr id="63" name="Flowchart: Decision 96"/>
           <p:cNvSpPr/>
           <p:nvPr/>
         </p:nvSpPr>
         <p:spPr>
           <a:xfrm>
-            <a:off x="4324972" y="2920532"/>
+            <a:off x="5031721" y="1460106"/>
             <a:ext cx="236048" cy="173380"/>
           </a:xfrm>
           <a:prstGeom prst="flowChartDecision">
             <a:avLst/>
           </a:prstGeom>
-          <a:solidFill>
-            <a:srgbClr val="7030A0"/>
-          </a:solidFill>
+          <a:noFill/>
           <a:ln w="19050">
             <a:solidFill>
               <a:srgbClr val="7030A0"/>
@@ -4198,16 +4395,57 @@
           </a:p>
         </p:txBody>
       </p:sp>
-      <p:sp>
-        <p:nvSpPr>
-          <p:cNvPr id="62" name="Rectangle 8"/>
+      <p:cxnSp>
+        <p:nvCxnSpPr>
+          <p:cNvPr id="64" name="Elbow Connector 63"/>
+          <p:cNvCxnSpPr>
+            <a:stCxn id="63" idx="3"/>
+            <a:endCxn id="62" idx="1"/>
+          </p:cNvCxnSpPr>
+          <p:nvPr/>
+        </p:nvCxnSpPr>
+        <p:spPr>
+          <a:xfrm>
+            <a:off x="5267769" y="1546796"/>
+            <a:ext cx="218878" cy="3080"/>
+          </a:xfrm>
+          <a:prstGeom prst="bentConnector3">
+            <a:avLst/>
+          </a:prstGeom>
+          <a:ln w="19050">
+            <a:solidFill>
+              <a:srgbClr val="7030A0"/>
+            </a:solidFill>
+            <a:headEnd type="none" w="med" len="med"/>
+            <a:tailEnd type="arrow" w="med" len="med"/>
+          </a:ln>
+          <a:effectLst/>
+        </p:spPr>
+        <p:style>
+          <a:lnRef idx="1">
+            <a:schemeClr val="accent2"/>
+          </a:lnRef>
+          <a:fillRef idx="2">
+            <a:schemeClr val="accent2"/>
+          </a:fillRef>
+          <a:effectRef idx="1">
+            <a:schemeClr val="accent2"/>
+          </a:effectRef>
+          <a:fontRef idx="minor">
+            <a:schemeClr val="dk1"/>
+          </a:fontRef>
+        </p:style>
+      </p:cxnSp>
+      <p:sp>
+        <p:nvSpPr>
+          <p:cNvPr id="76" name="Rectangle 8"/>
           <p:cNvSpPr/>
           <p:nvPr/>
         </p:nvSpPr>
         <p:spPr>
           <a:xfrm>
-            <a:off x="6313677" y="2858066"/>
-            <a:ext cx="708186" cy="346760"/>
+            <a:off x="7568006" y="531738"/>
+            <a:ext cx="898200" cy="285783"/>
           </a:xfrm>
           <a:prstGeom prst="rect">
             <a:avLst/>
@@ -4239,12 +4477,12 @@
           <a:p>
             <a:pPr algn="ctr"/>
             <a:r>
-              <a:rPr lang="en-US" sz="1050" dirty="0">
+              <a:rPr lang="en-US" sz="1050" dirty="0" smtClean="0">
                 <a:solidFill>
                   <a:srgbClr val="7030A0"/>
                 </a:solidFill>
               </a:rPr>
-              <a:t>Person</a:t>
+              <a:t>Phone</a:t>
             </a:r>
             <a:endParaRPr lang="en-SG" sz="1050" dirty="0">
               <a:solidFill>
@@ -4256,19 +4494,21 @@
       </p:sp>
       <p:sp>
         <p:nvSpPr>
-          <p:cNvPr id="63" name="Flowchart: Decision 96"/>
+          <p:cNvPr id="78" name="Flowchart: Decision 96"/>
           <p:cNvSpPr/>
           <p:nvPr/>
         </p:nvSpPr>
         <p:spPr>
           <a:xfrm>
-            <a:off x="5858751" y="2941676"/>
+            <a:off x="6214917" y="1466631"/>
             <a:ext cx="236048" cy="173380"/>
           </a:xfrm>
           <a:prstGeom prst="flowChartDecision">
             <a:avLst/>
           </a:prstGeom>
-          <a:noFill/>
+          <a:solidFill>
+            <a:srgbClr val="7030A0"/>
+          </a:solidFill>
           <a:ln w="19050">
             <a:solidFill>
               <a:srgbClr val="7030A0"/>
@@ -4301,20 +4541,23 @@
       </p:sp>
       <p:cxnSp>
         <p:nvCxnSpPr>
-          <p:cNvPr id="64" name="Elbow Connector 63"/>
+          <p:cNvPr id="79" name="Elbow Connector 78"/>
           <p:cNvCxnSpPr>
-            <a:stCxn id="63" idx="3"/>
-            <a:endCxn id="62" idx="1"/>
+            <a:cxnSpLocks/>
+            <a:stCxn id="78" idx="3"/>
+            <a:endCxn id="76" idx="1"/>
           </p:cNvCxnSpPr>
           <p:nvPr/>
         </p:nvCxnSpPr>
         <p:spPr>
-          <a:xfrm>
-            <a:off x="6094799" y="3028366"/>
-            <a:ext cx="218878" cy="3080"/>
+          <a:xfrm flipV="1">
+            <a:off x="6450965" y="674630"/>
+            <a:ext cx="1117041" cy="878691"/>
           </a:xfrm>
           <a:prstGeom prst="bentConnector3">
-            <a:avLst/>
+            <a:avLst>
+              <a:gd name="adj1" fmla="val 50000"/>
+            </a:avLst>
           </a:prstGeom>
           <a:ln w="19050">
             <a:solidFill>
@@ -4342,14 +4585,14 @@
       </p:cxnSp>
       <p:sp>
         <p:nvSpPr>
-          <p:cNvPr id="76" name="Rectangle 8"/>
+          <p:cNvPr id="80" name="Rectangle 8"/>
           <p:cNvSpPr/>
           <p:nvPr/>
         </p:nvSpPr>
         <p:spPr>
           <a:xfrm>
-            <a:off x="7712397" y="2564238"/>
-            <a:ext cx="708186" cy="285783"/>
+            <a:off x="7568003" y="871623"/>
+            <a:ext cx="898201" cy="285783"/>
           </a:xfrm>
           <a:prstGeom prst="rect">
             <a:avLst/>
@@ -4381,12 +4624,409 @@
           <a:p>
             <a:pPr algn="ctr"/>
             <a:r>
+              <a:rPr lang="en-US" sz="1050" dirty="0" smtClean="0">
+                <a:solidFill>
+                  <a:srgbClr val="7030A0"/>
+                </a:solidFill>
+              </a:rPr>
+              <a:t>Address</a:t>
+            </a:r>
+            <a:endParaRPr lang="en-SG" sz="1050" dirty="0">
+              <a:solidFill>
+                <a:srgbClr val="7030A0"/>
+              </a:solidFill>
+            </a:endParaRPr>
+          </a:p>
+        </p:txBody>
+      </p:sp>
+      <p:cxnSp>
+        <p:nvCxnSpPr>
+          <p:cNvPr id="81" name="Elbow Connector 80"/>
+          <p:cNvCxnSpPr>
+            <a:stCxn id="78" idx="3"/>
+            <a:endCxn id="80" idx="1"/>
+          </p:cNvCxnSpPr>
+          <p:nvPr/>
+        </p:nvCxnSpPr>
+        <p:spPr>
+          <a:xfrm flipV="1">
+            <a:off x="6450965" y="1014515"/>
+            <a:ext cx="1117038" cy="538806"/>
+          </a:xfrm>
+          <a:prstGeom prst="bentConnector3">
+            <a:avLst/>
+          </a:prstGeom>
+          <a:ln w="19050">
+            <a:solidFill>
+              <a:srgbClr val="7030A0"/>
+            </a:solidFill>
+            <a:headEnd type="none" w="med" len="med"/>
+            <a:tailEnd type="arrow" w="med" len="med"/>
+          </a:ln>
+          <a:effectLst/>
+        </p:spPr>
+        <p:style>
+          <a:lnRef idx="1">
+            <a:schemeClr val="accent2"/>
+          </a:lnRef>
+          <a:fillRef idx="2">
+            <a:schemeClr val="accent2"/>
+          </a:fillRef>
+          <a:effectRef idx="1">
+            <a:schemeClr val="accent2"/>
+          </a:effectRef>
+          <a:fontRef idx="minor">
+            <a:schemeClr val="dk1"/>
+          </a:fontRef>
+        </p:style>
+      </p:cxnSp>
+      <p:sp>
+        <p:nvSpPr>
+          <p:cNvPr id="83" name="Rectangle 8"/>
+          <p:cNvSpPr/>
+          <p:nvPr/>
+        </p:nvSpPr>
+        <p:spPr>
+          <a:xfrm>
+            <a:off x="7568002" y="1197975"/>
+            <a:ext cx="898202" cy="285783"/>
+          </a:xfrm>
+          <a:prstGeom prst="rect">
+            <a:avLst/>
+          </a:prstGeom>
+          <a:ln w="19050">
+            <a:solidFill>
+              <a:srgbClr val="7030A0"/>
+            </a:solidFill>
+          </a:ln>
+          <a:effectLst/>
+        </p:spPr>
+        <p:style>
+          <a:lnRef idx="1">
+            <a:schemeClr val="accent4"/>
+          </a:lnRef>
+          <a:fillRef idx="2">
+            <a:schemeClr val="accent4"/>
+          </a:fillRef>
+          <a:effectRef idx="1">
+            <a:schemeClr val="accent4"/>
+          </a:effectRef>
+          <a:fontRef idx="minor">
+            <a:schemeClr val="dk1"/>
+          </a:fontRef>
+        </p:style>
+        <p:txBody>
+          <a:bodyPr rtlCol="0" anchor="ctr"/>
+          <a:lstStyle/>
+          <a:p>
+            <a:pPr algn="ctr"/>
+            <a:r>
+              <a:rPr lang="en-US" sz="1050" dirty="0" err="1" smtClean="0">
+                <a:solidFill>
+                  <a:srgbClr val="7030A0"/>
+                </a:solidFill>
+              </a:rPr>
+              <a:t>OrderDate</a:t>
+            </a:r>
+            <a:endParaRPr lang="en-SG" sz="1050" dirty="0">
+              <a:solidFill>
+                <a:srgbClr val="7030A0"/>
+              </a:solidFill>
+            </a:endParaRPr>
+          </a:p>
+        </p:txBody>
+      </p:sp>
+      <p:cxnSp>
+        <p:nvCxnSpPr>
+          <p:cNvPr id="84" name="Elbow Connector 83"/>
+          <p:cNvCxnSpPr>
+            <a:stCxn id="78" idx="3"/>
+            <a:endCxn id="83" idx="1"/>
+          </p:cNvCxnSpPr>
+          <p:nvPr/>
+        </p:nvCxnSpPr>
+        <p:spPr>
+          <a:xfrm flipV="1">
+            <a:off x="6450965" y="1340867"/>
+            <a:ext cx="1117037" cy="212454"/>
+          </a:xfrm>
+          <a:prstGeom prst="bentConnector3">
+            <a:avLst/>
+          </a:prstGeom>
+          <a:ln w="19050">
+            <a:solidFill>
+              <a:srgbClr val="7030A0"/>
+            </a:solidFill>
+            <a:headEnd type="none" w="med" len="med"/>
+            <a:tailEnd type="arrow" w="med" len="med"/>
+          </a:ln>
+          <a:effectLst/>
+        </p:spPr>
+        <p:style>
+          <a:lnRef idx="1">
+            <a:schemeClr val="accent2"/>
+          </a:lnRef>
+          <a:fillRef idx="2">
+            <a:schemeClr val="accent2"/>
+          </a:fillRef>
+          <a:effectRef idx="1">
+            <a:schemeClr val="accent2"/>
+          </a:effectRef>
+          <a:fontRef idx="minor">
+            <a:schemeClr val="dk1"/>
+          </a:fontRef>
+        </p:style>
+      </p:cxnSp>
+      <p:sp>
+        <p:nvSpPr>
+          <p:cNvPr id="85" name="Rectangle 8"/>
+          <p:cNvSpPr/>
+          <p:nvPr/>
+        </p:nvSpPr>
+        <p:spPr>
+          <a:xfrm>
+            <a:off x="7568002" y="1520660"/>
+            <a:ext cx="898202" cy="285783"/>
+          </a:xfrm>
+          <a:prstGeom prst="rect">
+            <a:avLst/>
+          </a:prstGeom>
+          <a:ln w="19050">
+            <a:solidFill>
+              <a:srgbClr val="7030A0"/>
+            </a:solidFill>
+          </a:ln>
+          <a:effectLst/>
+        </p:spPr>
+        <p:style>
+          <a:lnRef idx="1">
+            <a:schemeClr val="accent4"/>
+          </a:lnRef>
+          <a:fillRef idx="2">
+            <a:schemeClr val="accent4"/>
+          </a:fillRef>
+          <a:effectRef idx="1">
+            <a:schemeClr val="accent4"/>
+          </a:effectRef>
+          <a:fontRef idx="minor">
+            <a:schemeClr val="dk1"/>
+          </a:fontRef>
+        </p:style>
+        <p:txBody>
+          <a:bodyPr rtlCol="0" anchor="ctr"/>
+          <a:lstStyle/>
+          <a:p>
+            <a:pPr algn="ctr"/>
+            <a:r>
+              <a:rPr lang="en-US" sz="1050" dirty="0" err="1" smtClean="0">
+                <a:solidFill>
+                  <a:srgbClr val="7030A0"/>
+                </a:solidFill>
+              </a:rPr>
+              <a:t>OrderStatus</a:t>
+            </a:r>
+            <a:endParaRPr lang="en-SG" sz="1050" dirty="0">
+              <a:solidFill>
+                <a:srgbClr val="7030A0"/>
+              </a:solidFill>
+            </a:endParaRPr>
+          </a:p>
+        </p:txBody>
+      </p:sp>
+      <p:cxnSp>
+        <p:nvCxnSpPr>
+          <p:cNvPr id="86" name="Elbow Connector 85"/>
+          <p:cNvCxnSpPr>
+            <a:stCxn id="78" idx="3"/>
+            <a:endCxn id="85" idx="1"/>
+          </p:cNvCxnSpPr>
+          <p:nvPr/>
+        </p:nvCxnSpPr>
+        <p:spPr>
+          <a:xfrm>
+            <a:off x="6450965" y="1553321"/>
+            <a:ext cx="1117037" cy="110231"/>
+          </a:xfrm>
+          <a:prstGeom prst="bentConnector3">
+            <a:avLst/>
+          </a:prstGeom>
+          <a:ln w="19050">
+            <a:solidFill>
+              <a:srgbClr val="7030A0"/>
+            </a:solidFill>
+            <a:headEnd type="none" w="med" len="med"/>
+            <a:tailEnd type="arrow" w="med" len="med"/>
+          </a:ln>
+          <a:effectLst/>
+        </p:spPr>
+        <p:style>
+          <a:lnRef idx="1">
+            <a:schemeClr val="accent2"/>
+          </a:lnRef>
+          <a:fillRef idx="2">
+            <a:schemeClr val="accent2"/>
+          </a:fillRef>
+          <a:effectRef idx="1">
+            <a:schemeClr val="accent2"/>
+          </a:effectRef>
+          <a:fontRef idx="minor">
+            <a:schemeClr val="dk1"/>
+          </a:fontRef>
+        </p:style>
+      </p:cxnSp>
+      <p:cxnSp>
+        <p:nvCxnSpPr>
+          <p:cNvPr id="97" name="Elbow Connector 63"/>
+          <p:cNvCxnSpPr>
+            <a:stCxn id="99" idx="3"/>
+          </p:cNvCxnSpPr>
+          <p:nvPr/>
+        </p:nvCxnSpPr>
+        <p:spPr>
+          <a:xfrm rot="5400000">
+            <a:off x="2726581" y="1205989"/>
+            <a:ext cx="293825" cy="5938"/>
+          </a:xfrm>
+          <a:prstGeom prst="bentConnector3">
+            <a:avLst>
+              <a:gd name="adj1" fmla="val 50000"/>
+            </a:avLst>
+          </a:prstGeom>
+          <a:ln w="19050">
+            <a:solidFill>
+              <a:srgbClr val="7030A0"/>
+            </a:solidFill>
+            <a:prstDash val="sysDot"/>
+            <a:headEnd type="none" w="med" len="med"/>
+            <a:tailEnd type="none" w="med" len="med"/>
+          </a:ln>
+          <a:effectLst/>
+        </p:spPr>
+        <p:style>
+          <a:lnRef idx="1">
+            <a:schemeClr val="accent2"/>
+          </a:lnRef>
+          <a:fillRef idx="2">
+            <a:schemeClr val="accent2"/>
+          </a:fillRef>
+          <a:effectRef idx="1">
+            <a:schemeClr val="accent2"/>
+          </a:effectRef>
+          <a:fontRef idx="minor">
+            <a:schemeClr val="dk1"/>
+          </a:fontRef>
+        </p:style>
+      </p:cxnSp>
+      <p:sp>
+        <p:nvSpPr>
+          <p:cNvPr id="99" name="Isosceles Triangle 102"/>
+          <p:cNvSpPr/>
+          <p:nvPr/>
+        </p:nvSpPr>
+        <p:spPr>
+          <a:xfrm rot="10800000" flipV="1">
+            <a:off x="2735269" y="904984"/>
+            <a:ext cx="282387" cy="157062"/>
+          </a:xfrm>
+          <a:prstGeom prst="triangle">
+            <a:avLst/>
+          </a:prstGeom>
+          <a:ln w="19050">
+            <a:solidFill>
+              <a:srgbClr val="7030A0"/>
+            </a:solidFill>
+          </a:ln>
+          <a:effectLst/>
+        </p:spPr>
+        <p:style>
+          <a:lnRef idx="1">
+            <a:schemeClr val="accent4"/>
+          </a:lnRef>
+          <a:fillRef idx="2">
+            <a:schemeClr val="accent4"/>
+          </a:fillRef>
+          <a:effectRef idx="1">
+            <a:schemeClr val="accent4"/>
+          </a:effectRef>
+          <a:fontRef idx="minor">
+            <a:schemeClr val="dk1"/>
+          </a:fontRef>
+        </p:style>
+        <p:txBody>
+          <a:bodyPr rtlCol="0" anchor="ctr"/>
+          <a:lstStyle/>
+          <a:p>
+            <a:pPr algn="ctr"/>
+            <a:endParaRPr lang="en-SG" sz="1050" b="1">
+              <a:solidFill>
+                <a:srgbClr val="92D050"/>
+              </a:solidFill>
+            </a:endParaRPr>
+          </a:p>
+        </p:txBody>
+      </p:sp>
+      <p:sp>
+        <p:nvSpPr>
+          <p:cNvPr id="100" name="Rectangle 8"/>
+          <p:cNvSpPr/>
+          <p:nvPr/>
+        </p:nvSpPr>
+        <p:spPr>
+          <a:xfrm>
+            <a:off x="433892" y="516780"/>
+            <a:ext cx="1443661" cy="364396"/>
+          </a:xfrm>
+          <a:prstGeom prst="rect">
+            <a:avLst/>
+          </a:prstGeom>
+          <a:ln w="19050">
+            <a:solidFill>
+              <a:srgbClr val="7030A0"/>
+            </a:solidFill>
+          </a:ln>
+          <a:effectLst/>
+        </p:spPr>
+        <p:style>
+          <a:lnRef idx="1">
+            <a:schemeClr val="accent4"/>
+          </a:lnRef>
+          <a:fillRef idx="2">
+            <a:schemeClr val="accent4"/>
+          </a:fillRef>
+          <a:effectRef idx="1">
+            <a:schemeClr val="accent4"/>
+          </a:effectRef>
+          <a:fontRef idx="minor">
+            <a:schemeClr val="dk1"/>
+          </a:fontRef>
+        </p:style>
+        <p:txBody>
+          <a:bodyPr rtlCol="0" anchor="ctr"/>
+          <a:lstStyle/>
+          <a:p>
+            <a:pPr algn="ctr"/>
+            <a:r>
               <a:rPr lang="en-US" sz="1050" dirty="0">
                 <a:solidFill>
                   <a:srgbClr val="7030A0"/>
                 </a:solidFill>
               </a:rPr>
-              <a:t>Name</a:t>
+              <a:t>&lt;&lt;interface&gt;&gt;</a:t>
+            </a:r>
+            <a:br>
+              <a:rPr lang="en-US" sz="1050" dirty="0">
+                <a:solidFill>
+                  <a:srgbClr val="7030A0"/>
+                </a:solidFill>
+              </a:rPr>
+            </a:br>
+            <a:r>
+              <a:rPr lang="en-US" sz="1050" dirty="0" err="1" smtClean="0">
+                <a:solidFill>
+                  <a:srgbClr val="7030A0"/>
+                </a:solidFill>
+              </a:rPr>
+              <a:t>ReadOnlyOrderBook</a:t>
             </a:r>
             <a:endParaRPr lang="en-SG" sz="1050" dirty="0">
               <a:solidFill>
@@ -4398,20 +5038,597 @@
       </p:sp>
       <p:sp>
         <p:nvSpPr>
-          <p:cNvPr id="78" name="Flowchart: Decision 96"/>
+          <p:cNvPr id="114" name="TextBox 113"/>
+          <p:cNvSpPr txBox="1"/>
+          <p:nvPr/>
+        </p:nvSpPr>
+        <p:spPr>
+          <a:xfrm>
+            <a:off x="4954352" y="1867760"/>
+            <a:ext cx="881018" cy="261610"/>
+          </a:xfrm>
+          <a:prstGeom prst="rect">
+            <a:avLst/>
+          </a:prstGeom>
+          <a:noFill/>
+        </p:spPr>
+        <p:txBody>
+          <a:bodyPr wrap="square" rtlCol="0">
+            <a:spAutoFit/>
+          </a:bodyPr>
+          <a:lstStyle/>
+          <a:p>
+            <a:pPr algn="r"/>
+            <a:r>
+              <a:rPr lang="en-US" sz="1100" dirty="0">
+                <a:solidFill>
+                  <a:srgbClr val="7030A0"/>
+                </a:solidFill>
+              </a:rPr>
+              <a:t>filtered list</a:t>
+            </a:r>
+            <a:endParaRPr lang="en-SG" sz="1100" dirty="0">
+              <a:solidFill>
+                <a:srgbClr val="7030A0"/>
+              </a:solidFill>
+            </a:endParaRPr>
+          </a:p>
+        </p:txBody>
+      </p:sp>
+      <p:sp>
+        <p:nvSpPr>
+          <p:cNvPr id="122" name="Rectangle 8"/>
           <p:cNvSpPr/>
           <p:nvPr/>
         </p:nvSpPr>
         <p:spPr>
           <a:xfrm>
-            <a:off x="7041947" y="2948201"/>
-            <a:ext cx="236048" cy="173380"/>
-          </a:xfrm>
-          <a:prstGeom prst="flowChartDecision">
+            <a:off x="1203390" y="6185193"/>
+            <a:ext cx="1066800" cy="346760"/>
+          </a:xfrm>
+          <a:prstGeom prst="rect">
             <a:avLst/>
           </a:prstGeom>
+          <a:ln w="19050">
+            <a:solidFill>
+              <a:srgbClr val="7030A0"/>
+            </a:solidFill>
+          </a:ln>
+          <a:effectLst/>
+        </p:spPr>
+        <p:style>
+          <a:lnRef idx="1">
+            <a:schemeClr val="accent4"/>
+          </a:lnRef>
+          <a:fillRef idx="2">
+            <a:schemeClr val="accent4"/>
+          </a:fillRef>
+          <a:effectRef idx="1">
+            <a:schemeClr val="accent4"/>
+          </a:effectRef>
+          <a:fontRef idx="minor">
+            <a:schemeClr val="dk1"/>
+          </a:fontRef>
+        </p:style>
+        <p:txBody>
+          <a:bodyPr rtlCol="0" anchor="ctr"/>
+          <a:lstStyle/>
+          <a:p>
+            <a:pPr algn="ctr"/>
+            <a:r>
+              <a:rPr lang="en-US" sz="1050" dirty="0">
+                <a:solidFill>
+                  <a:srgbClr val="7030A0"/>
+                </a:solidFill>
+              </a:rPr>
+              <a:t>&lt;&lt;interface&gt;&gt;</a:t>
+            </a:r>
+            <a:r>
+              <a:rPr lang="en-US" sz="1050">
+                <a:solidFill>
+                  <a:srgbClr val="7030A0"/>
+                </a:solidFill>
+              </a:rPr>
+              <a:t/>
+            </a:r>
+            <a:br>
+              <a:rPr lang="en-US" sz="1050">
+                <a:solidFill>
+                  <a:srgbClr val="7030A0"/>
+                </a:solidFill>
+              </a:rPr>
+            </a:br>
+            <a:r>
+              <a:rPr lang="en-US" sz="1050" dirty="0" err="1">
+                <a:solidFill>
+                  <a:srgbClr val="7030A0"/>
+                </a:solidFill>
+              </a:rPr>
+              <a:t>ObservableList</a:t>
+            </a:r>
+            <a:endParaRPr lang="en-SG" sz="1050" dirty="0">
+              <a:solidFill>
+                <a:srgbClr val="7030A0"/>
+              </a:solidFill>
+            </a:endParaRPr>
+          </a:p>
+        </p:txBody>
+      </p:sp>
+      <p:cxnSp>
+        <p:nvCxnSpPr>
+          <p:cNvPr id="124" name="Elbow Connector 122"/>
+          <p:cNvCxnSpPr>
+            <a:stCxn id="119" idx="1"/>
+            <a:endCxn id="122" idx="1"/>
+          </p:cNvCxnSpPr>
+          <p:nvPr/>
+        </p:nvCxnSpPr>
+        <p:spPr>
+          <a:xfrm rot="16200000" flipH="1">
+            <a:off x="-1189681" y="3965501"/>
+            <a:ext cx="4258743" cy="527400"/>
+          </a:xfrm>
+          <a:prstGeom prst="bentConnector2">
+            <a:avLst/>
+          </a:prstGeom>
+          <a:ln w="19050">
+            <a:solidFill>
+              <a:srgbClr val="7030A0"/>
+            </a:solidFill>
+            <a:prstDash val="sysDot"/>
+            <a:headEnd type="none" w="med" len="med"/>
+            <a:tailEnd type="arrow" w="med" len="med"/>
+          </a:ln>
+          <a:effectLst/>
+        </p:spPr>
+        <p:style>
+          <a:lnRef idx="1">
+            <a:schemeClr val="accent2"/>
+          </a:lnRef>
+          <a:fillRef idx="2">
+            <a:schemeClr val="accent2"/>
+          </a:fillRef>
+          <a:effectRef idx="1">
+            <a:schemeClr val="accent2"/>
+          </a:effectRef>
+          <a:fontRef idx="minor">
+            <a:schemeClr val="dk1"/>
+          </a:fontRef>
+        </p:style>
+      </p:cxnSp>
+      <p:sp>
+        <p:nvSpPr>
+          <p:cNvPr id="54" name="TextBox 53"/>
+          <p:cNvSpPr txBox="1"/>
+          <p:nvPr/>
+        </p:nvSpPr>
+        <p:spPr>
+          <a:xfrm>
+            <a:off x="3602949" y="1629909"/>
+            <a:ext cx="189257" cy="178683"/>
+          </a:xfrm>
+          <a:prstGeom prst="rect">
+            <a:avLst/>
+          </a:prstGeom>
+          <a:noFill/>
+        </p:spPr>
+        <p:txBody>
+          <a:bodyPr wrap="square" lIns="0" tIns="0" rIns="0" bIns="0" rtlCol="0">
+            <a:noAutofit/>
+          </a:bodyPr>
+          <a:lstStyle/>
+          <a:p>
+            <a:pPr algn="ctr"/>
+            <a:r>
+              <a:rPr lang="en-US" sz="1100" dirty="0">
+                <a:solidFill>
+                  <a:srgbClr val="7030A0"/>
+                </a:solidFill>
+              </a:rPr>
+              <a:t>1</a:t>
+            </a:r>
+            <a:endParaRPr lang="en-SG" sz="1100" dirty="0">
+              <a:solidFill>
+                <a:srgbClr val="7030A0"/>
+              </a:solidFill>
+            </a:endParaRPr>
+          </a:p>
+        </p:txBody>
+      </p:sp>
+      <p:sp>
+        <p:nvSpPr>
+          <p:cNvPr id="61" name="TextBox 60"/>
+          <p:cNvSpPr txBox="1"/>
+          <p:nvPr/>
+        </p:nvSpPr>
+        <p:spPr>
+          <a:xfrm>
+            <a:off x="5308226" y="1616347"/>
+            <a:ext cx="189257" cy="178683"/>
+          </a:xfrm>
+          <a:prstGeom prst="rect">
+            <a:avLst/>
+          </a:prstGeom>
+          <a:noFill/>
+        </p:spPr>
+        <p:txBody>
+          <a:bodyPr wrap="square" lIns="0" tIns="0" rIns="0" bIns="0" rtlCol="0">
+            <a:noAutofit/>
+          </a:bodyPr>
+          <a:lstStyle/>
+          <a:p>
+            <a:pPr algn="ctr"/>
+            <a:r>
+              <a:rPr lang="en-US" sz="1100" dirty="0">
+                <a:solidFill>
+                  <a:srgbClr val="7030A0"/>
+                </a:solidFill>
+              </a:rPr>
+              <a:t>*</a:t>
+            </a:r>
+            <a:endParaRPr lang="en-SG" sz="1100" dirty="0">
+              <a:solidFill>
+                <a:srgbClr val="7030A0"/>
+              </a:solidFill>
+            </a:endParaRPr>
+          </a:p>
+        </p:txBody>
+      </p:sp>
+      <p:sp>
+        <p:nvSpPr>
+          <p:cNvPr id="65" name="TextBox 64"/>
+          <p:cNvSpPr txBox="1"/>
+          <p:nvPr/>
+        </p:nvSpPr>
+        <p:spPr>
+          <a:xfrm>
+            <a:off x="1746364" y="1275145"/>
+            <a:ext cx="170110" cy="137542"/>
+          </a:xfrm>
+          <a:prstGeom prst="rect">
+            <a:avLst/>
+          </a:prstGeom>
+          <a:noFill/>
+        </p:spPr>
+        <p:txBody>
+          <a:bodyPr wrap="square" lIns="0" tIns="0" rIns="0" bIns="0" rtlCol="0">
+            <a:noAutofit/>
+          </a:bodyPr>
+          <a:lstStyle/>
+          <a:p>
+            <a:pPr algn="ctr"/>
+            <a:r>
+              <a:rPr lang="en-US" sz="1100" dirty="0">
+                <a:solidFill>
+                  <a:srgbClr val="7030A0"/>
+                </a:solidFill>
+              </a:rPr>
+              <a:t>1</a:t>
+            </a:r>
+            <a:endParaRPr lang="en-SG" sz="1100" dirty="0">
+              <a:solidFill>
+                <a:srgbClr val="7030A0"/>
+              </a:solidFill>
+            </a:endParaRPr>
+          </a:p>
+        </p:txBody>
+      </p:sp>
+      <p:sp>
+        <p:nvSpPr>
+          <p:cNvPr id="66" name="TextBox 65"/>
+          <p:cNvSpPr txBox="1"/>
+          <p:nvPr/>
+        </p:nvSpPr>
+        <p:spPr>
+          <a:xfrm>
+            <a:off x="1736790" y="4546733"/>
+            <a:ext cx="189257" cy="178683"/>
+          </a:xfrm>
+          <a:prstGeom prst="rect">
+            <a:avLst/>
+          </a:prstGeom>
+          <a:noFill/>
+        </p:spPr>
+        <p:txBody>
+          <a:bodyPr wrap="square" lIns="0" tIns="0" rIns="0" bIns="0" rtlCol="0">
+            <a:noAutofit/>
+          </a:bodyPr>
+          <a:lstStyle/>
+          <a:p>
+            <a:pPr algn="ctr"/>
+            <a:r>
+              <a:rPr lang="en-US" sz="1100" dirty="0">
+                <a:solidFill>
+                  <a:srgbClr val="7030A0"/>
+                </a:solidFill>
+              </a:rPr>
+              <a:t>1</a:t>
+            </a:r>
+            <a:endParaRPr lang="en-SG" sz="1100" dirty="0">
+              <a:solidFill>
+                <a:srgbClr val="7030A0"/>
+              </a:solidFill>
+            </a:endParaRPr>
+          </a:p>
+        </p:txBody>
+      </p:sp>
+      <p:sp>
+        <p:nvSpPr>
+          <p:cNvPr id="70" name="TextBox 69"/>
+          <p:cNvSpPr txBox="1"/>
+          <p:nvPr/>
+        </p:nvSpPr>
+        <p:spPr>
+          <a:xfrm>
+            <a:off x="5622866" y="1723256"/>
+            <a:ext cx="189257" cy="178683"/>
+          </a:xfrm>
+          <a:prstGeom prst="rect">
+            <a:avLst/>
+          </a:prstGeom>
+          <a:noFill/>
+        </p:spPr>
+        <p:txBody>
+          <a:bodyPr wrap="square" lIns="0" tIns="0" rIns="0" bIns="0" rtlCol="0">
+            <a:noAutofit/>
+          </a:bodyPr>
+          <a:lstStyle/>
+          <a:p>
+            <a:pPr algn="ctr"/>
+            <a:r>
+              <a:rPr lang="en-US" sz="1100" dirty="0">
+                <a:solidFill>
+                  <a:srgbClr val="7030A0"/>
+                </a:solidFill>
+              </a:rPr>
+              <a:t>1</a:t>
+            </a:r>
+            <a:endParaRPr lang="en-SG" sz="1100" dirty="0">
+              <a:solidFill>
+                <a:srgbClr val="7030A0"/>
+              </a:solidFill>
+            </a:endParaRPr>
+          </a:p>
+        </p:txBody>
+      </p:sp>
+      <p:sp>
+        <p:nvSpPr>
+          <p:cNvPr id="52" name="Rectangle 8">
+            <a:extLst>
+              <a:ext uri="{FF2B5EF4-FFF2-40B4-BE49-F238E27FC236}">
+                <a16:creationId xmlns:a16="http://schemas.microsoft.com/office/drawing/2014/main" xmlns="" id="{ABDCDBD2-131A-4B66-A2F2-43BBEE82C773}"/>
+              </a:ext>
+            </a:extLst>
+          </p:cNvPr>
+          <p:cNvSpPr/>
+          <p:nvPr/>
+        </p:nvSpPr>
+        <p:spPr>
+          <a:xfrm>
+            <a:off x="7568003" y="200682"/>
+            <a:ext cx="898203" cy="285783"/>
+          </a:xfrm>
+          <a:prstGeom prst="rect">
+            <a:avLst/>
+          </a:prstGeom>
+          <a:ln w="19050">
+            <a:solidFill>
+              <a:srgbClr val="7030A0"/>
+            </a:solidFill>
+          </a:ln>
+          <a:effectLst/>
+        </p:spPr>
+        <p:style>
+          <a:lnRef idx="1">
+            <a:schemeClr val="accent4"/>
+          </a:lnRef>
+          <a:fillRef idx="2">
+            <a:schemeClr val="accent4"/>
+          </a:fillRef>
+          <a:effectRef idx="1">
+            <a:schemeClr val="accent4"/>
+          </a:effectRef>
+          <a:fontRef idx="minor">
+            <a:schemeClr val="dk1"/>
+          </a:fontRef>
+        </p:style>
+        <p:txBody>
+          <a:bodyPr rtlCol="0" anchor="ctr"/>
+          <a:lstStyle/>
+          <a:p>
+            <a:pPr algn="ctr"/>
+            <a:r>
+              <a:rPr lang="en-US" sz="1050" dirty="0" smtClean="0">
+                <a:solidFill>
+                  <a:srgbClr val="7030A0"/>
+                </a:solidFill>
+              </a:rPr>
+              <a:t>Name</a:t>
+            </a:r>
+            <a:endParaRPr lang="en-SG" sz="1050" dirty="0">
+              <a:solidFill>
+                <a:srgbClr val="7030A0"/>
+              </a:solidFill>
+            </a:endParaRPr>
+          </a:p>
+        </p:txBody>
+      </p:sp>
+      <p:cxnSp>
+        <p:nvCxnSpPr>
+          <p:cNvPr id="53" name="Elbow Connector 78">
+            <a:extLst>
+              <a:ext uri="{FF2B5EF4-FFF2-40B4-BE49-F238E27FC236}">
+                <a16:creationId xmlns:a16="http://schemas.microsoft.com/office/drawing/2014/main" xmlns="" id="{B97967F8-618A-448B-81FD-CDFD4AF0EC64}"/>
+              </a:ext>
+            </a:extLst>
+          </p:cNvPr>
+          <p:cNvCxnSpPr>
+            <a:cxnSpLocks/>
+            <a:stCxn id="78" idx="3"/>
+            <a:endCxn id="52" idx="1"/>
+          </p:cNvCxnSpPr>
+          <p:nvPr/>
+        </p:nvCxnSpPr>
+        <p:spPr>
+          <a:xfrm flipV="1">
+            <a:off x="6450965" y="343574"/>
+            <a:ext cx="1117038" cy="1209747"/>
+          </a:xfrm>
+          <a:prstGeom prst="bentConnector3">
+            <a:avLst>
+              <a:gd name="adj1" fmla="val 50000"/>
+            </a:avLst>
+          </a:prstGeom>
+          <a:ln w="19050">
+            <a:solidFill>
+              <a:srgbClr val="7030A0"/>
+            </a:solidFill>
+            <a:headEnd type="none" w="med" len="med"/>
+            <a:tailEnd type="arrow" w="med" len="med"/>
+          </a:ln>
+          <a:effectLst/>
+        </p:spPr>
+        <p:style>
+          <a:lnRef idx="1">
+            <a:schemeClr val="accent2"/>
+          </a:lnRef>
+          <a:fillRef idx="2">
+            <a:schemeClr val="accent2"/>
+          </a:fillRef>
+          <a:effectRef idx="1">
+            <a:schemeClr val="accent2"/>
+          </a:effectRef>
+          <a:fontRef idx="minor">
+            <a:schemeClr val="dk1"/>
+          </a:fontRef>
+        </p:style>
+      </p:cxnSp>
+      <p:sp>
+        <p:nvSpPr>
+          <p:cNvPr id="55" name="Rectangle 8"/>
+          <p:cNvSpPr/>
+          <p:nvPr/>
+        </p:nvSpPr>
+        <p:spPr>
+          <a:xfrm>
+            <a:off x="2343151" y="516780"/>
+            <a:ext cx="1060683" cy="364396"/>
+          </a:xfrm>
+          <a:prstGeom prst="rect">
+            <a:avLst/>
+          </a:prstGeom>
+          <a:ln w="19050">
+            <a:solidFill>
+              <a:srgbClr val="7030A0"/>
+            </a:solidFill>
+          </a:ln>
+          <a:effectLst/>
+        </p:spPr>
+        <p:style>
+          <a:lnRef idx="1">
+            <a:schemeClr val="accent4"/>
+          </a:lnRef>
+          <a:fillRef idx="2">
+            <a:schemeClr val="accent4"/>
+          </a:fillRef>
+          <a:effectRef idx="1">
+            <a:schemeClr val="accent4"/>
+          </a:effectRef>
+          <a:fontRef idx="minor">
+            <a:schemeClr val="dk1"/>
+          </a:fontRef>
+        </p:style>
+        <p:txBody>
+          <a:bodyPr rtlCol="0" anchor="ctr"/>
+          <a:lstStyle/>
+          <a:p>
+            <a:pPr algn="ctr"/>
+            <a:r>
+              <a:rPr lang="en-US" sz="1050" dirty="0" err="1" smtClean="0">
+                <a:solidFill>
+                  <a:srgbClr val="7030A0"/>
+                </a:solidFill>
+              </a:rPr>
+              <a:t>Order</a:t>
+            </a:r>
+            <a:r>
+              <a:rPr lang="en-US" sz="1050" dirty="0" err="1" smtClean="0">
+                <a:solidFill>
+                  <a:srgbClr val="7030A0"/>
+                </a:solidFill>
+              </a:rPr>
+              <a:t>Book</a:t>
+            </a:r>
+            <a:endParaRPr lang="en-SG" sz="1050" dirty="0">
+              <a:solidFill>
+                <a:srgbClr val="7030A0"/>
+              </a:solidFill>
+            </a:endParaRPr>
+          </a:p>
+        </p:txBody>
+      </p:sp>
+      <p:cxnSp>
+        <p:nvCxnSpPr>
+          <p:cNvPr id="60" name="Straight Arrow Connector 59"/>
+          <p:cNvCxnSpPr>
+            <a:stCxn id="51" idx="1"/>
+            <a:endCxn id="49" idx="1"/>
+          </p:cNvCxnSpPr>
+          <p:nvPr/>
+        </p:nvCxnSpPr>
+        <p:spPr>
+          <a:xfrm>
+            <a:off x="3497942" y="1525652"/>
+            <a:ext cx="367678" cy="12320"/>
+          </a:xfrm>
+          <a:prstGeom prst="straightConnector1">
+            <a:avLst/>
+          </a:prstGeom>
+          <a:ln w="19050">
+            <a:solidFill>
+              <a:srgbClr val="7030A0"/>
+            </a:solidFill>
+            <a:headEnd type="none" w="med" len="med"/>
+            <a:tailEnd type="arrow" w="med" len="med"/>
+          </a:ln>
+          <a:effectLst/>
+        </p:spPr>
+        <p:style>
+          <a:lnRef idx="1">
+            <a:schemeClr val="accent2"/>
+          </a:lnRef>
+          <a:fillRef idx="2">
+            <a:schemeClr val="accent2"/>
+          </a:fillRef>
+          <a:effectRef idx="1">
+            <a:schemeClr val="accent2"/>
+          </a:effectRef>
+          <a:fontRef idx="minor">
+            <a:schemeClr val="dk1"/>
+          </a:fontRef>
+        </p:style>
+      </p:cxnSp>
+      <p:sp>
+        <p:nvSpPr>
+          <p:cNvPr id="68" name="Isosceles Triangle 102"/>
+          <p:cNvSpPr/>
+          <p:nvPr/>
+        </p:nvSpPr>
+        <p:spPr>
+          <a:xfrm rot="16200000">
+            <a:off x="1842043" y="587588"/>
+            <a:ext cx="271014" cy="187417"/>
+          </a:xfrm>
+          <a:prstGeom prst="triangle">
+            <a:avLst>
+              <a:gd name="adj" fmla="val 44517"/>
+            </a:avLst>
+          </a:prstGeom>
           <a:solidFill>
-            <a:srgbClr val="7030A0"/>
+            <a:schemeClr val="accent4">
+              <a:lumMod val="20000"/>
+              <a:lumOff val="80000"/>
+            </a:schemeClr>
           </a:solidFill>
           <a:ln w="19050">
             <a:solidFill>
@@ -4439,32 +5656,36 @@
           <a:lstStyle/>
           <a:p>
             <a:pPr algn="ctr"/>
-            <a:endParaRPr lang="en-US" sz="1050"/>
+            <a:endParaRPr lang="en-SG" sz="1050"/>
           </a:p>
         </p:txBody>
       </p:sp>
       <p:cxnSp>
         <p:nvCxnSpPr>
-          <p:cNvPr id="79" name="Elbow Connector 78"/>
+          <p:cNvPr id="69" name="Elbow Connector 63"/>
           <p:cNvCxnSpPr>
-            <a:cxnSpLocks/>
+            <a:stCxn id="68" idx="3"/>
+            <a:endCxn id="55" idx="1"/>
           </p:cNvCxnSpPr>
           <p:nvPr/>
         </p:nvCxnSpPr>
         <p:spPr>
-          <a:xfrm flipV="1">
-            <a:off x="7277995" y="2706821"/>
-            <a:ext cx="434402" cy="327761"/>
+          <a:xfrm>
+            <a:off x="2071259" y="696157"/>
+            <a:ext cx="271892" cy="2821"/>
           </a:xfrm>
           <a:prstGeom prst="bentConnector3">
-            <a:avLst/>
+            <a:avLst>
+              <a:gd name="adj1" fmla="val 50000"/>
+            </a:avLst>
           </a:prstGeom>
           <a:ln w="19050">
             <a:solidFill>
               <a:srgbClr val="7030A0"/>
             </a:solidFill>
+            <a:prstDash val="sysDot"/>
             <a:headEnd type="none" w="med" len="med"/>
-            <a:tailEnd type="arrow" w="med" len="med"/>
+            <a:tailEnd type="none" w="med" len="med"/>
           </a:ln>
           <a:effectLst/>
         </p:spPr>
@@ -4485,14 +5706,14 @@
       </p:cxnSp>
       <p:sp>
         <p:nvSpPr>
-          <p:cNvPr id="80" name="Rectangle 8"/>
+          <p:cNvPr id="59" name="Rectangle 8"/>
           <p:cNvSpPr/>
           <p:nvPr/>
         </p:nvSpPr>
         <p:spPr>
           <a:xfrm>
-            <a:off x="7712397" y="2887216"/>
-            <a:ext cx="708186" cy="285783"/>
+            <a:off x="7568002" y="1860545"/>
+            <a:ext cx="898202" cy="285783"/>
           </a:xfrm>
           <a:prstGeom prst="rect">
             <a:avLst/>
@@ -4524,12 +5745,12 @@
           <a:p>
             <a:pPr algn="ctr"/>
             <a:r>
-              <a:rPr lang="en-US" sz="1050" dirty="0">
+              <a:rPr lang="en-US" sz="1050" dirty="0" smtClean="0">
                 <a:solidFill>
                   <a:srgbClr val="7030A0"/>
                 </a:solidFill>
               </a:rPr>
-              <a:t>Phone</a:t>
+              <a:t>Deliveryman</a:t>
             </a:r>
             <a:endParaRPr lang="en-SG" sz="1050" dirty="0">
               <a:solidFill>
@@ -4539,57 +5760,16 @@
           </a:p>
         </p:txBody>
       </p:sp>
-      <p:cxnSp>
-        <p:nvCxnSpPr>
-          <p:cNvPr id="81" name="Elbow Connector 80"/>
-          <p:cNvCxnSpPr>
-            <a:stCxn id="78" idx="3"/>
-            <a:endCxn id="80" idx="1"/>
-          </p:cNvCxnSpPr>
-          <p:nvPr/>
-        </p:nvCxnSpPr>
-        <p:spPr>
-          <a:xfrm flipV="1">
-            <a:off x="7277995" y="3030108"/>
-            <a:ext cx="434402" cy="4783"/>
-          </a:xfrm>
-          <a:prstGeom prst="bentConnector3">
-            <a:avLst/>
-          </a:prstGeom>
-          <a:ln w="19050">
-            <a:solidFill>
-              <a:srgbClr val="7030A0"/>
-            </a:solidFill>
-            <a:headEnd type="none" w="med" len="med"/>
-            <a:tailEnd type="arrow" w="med" len="med"/>
-          </a:ln>
-          <a:effectLst/>
-        </p:spPr>
-        <p:style>
-          <a:lnRef idx="1">
-            <a:schemeClr val="accent2"/>
-          </a:lnRef>
-          <a:fillRef idx="2">
-            <a:schemeClr val="accent2"/>
-          </a:fillRef>
-          <a:effectRef idx="1">
-            <a:schemeClr val="accent2"/>
-          </a:effectRef>
-          <a:fontRef idx="minor">
-            <a:schemeClr val="dk1"/>
-          </a:fontRef>
-        </p:style>
-      </p:cxnSp>
-      <p:sp>
-        <p:nvSpPr>
-          <p:cNvPr id="83" name="Rectangle 8"/>
+      <p:sp>
+        <p:nvSpPr>
+          <p:cNvPr id="67" name="Rectangle 8"/>
           <p:cNvSpPr/>
           <p:nvPr/>
         </p:nvSpPr>
         <p:spPr>
           <a:xfrm>
-            <a:off x="7712397" y="3210194"/>
-            <a:ext cx="708186" cy="285783"/>
+            <a:off x="7568002" y="2211853"/>
+            <a:ext cx="898202" cy="285783"/>
           </a:xfrm>
           <a:prstGeom prst="rect">
             <a:avLst/>
@@ -4621,12 +5801,12 @@
           <a:p>
             <a:pPr algn="ctr"/>
             <a:r>
-              <a:rPr lang="en-US" sz="1050" dirty="0">
+              <a:rPr lang="en-US" sz="1050" smtClean="0">
                 <a:solidFill>
                   <a:srgbClr val="7030A0"/>
                 </a:solidFill>
               </a:rPr>
-              <a:t>Email</a:t>
+              <a:t>Food</a:t>
             </a:r>
             <a:endParaRPr lang="en-SG" sz="1050" dirty="0">
               <a:solidFill>
@@ -4638,20 +5818,22 @@
       </p:sp>
       <p:cxnSp>
         <p:nvCxnSpPr>
-          <p:cNvPr id="84" name="Elbow Connector 83"/>
+          <p:cNvPr id="71" name="Elbow Connector 70"/>
           <p:cNvCxnSpPr>
             <a:stCxn id="78" idx="3"/>
-            <a:endCxn id="83" idx="1"/>
+            <a:endCxn id="59" idx="1"/>
           </p:cNvCxnSpPr>
           <p:nvPr/>
         </p:nvCxnSpPr>
         <p:spPr>
           <a:xfrm>
-            <a:off x="7277995" y="3034891"/>
-            <a:ext cx="434402" cy="318195"/>
+            <a:off x="6450965" y="1553321"/>
+            <a:ext cx="1117037" cy="450116"/>
           </a:xfrm>
           <a:prstGeom prst="bentConnector3">
-            <a:avLst/>
+            <a:avLst>
+              <a:gd name="adj1" fmla="val 50000"/>
+            </a:avLst>
           </a:prstGeom>
           <a:ln w="19050">
             <a:solidFill>
@@ -4677,16 +5859,98 @@
           </a:fontRef>
         </p:style>
       </p:cxnSp>
-      <p:sp>
-        <p:nvSpPr>
-          <p:cNvPr id="85" name="Rectangle 8"/>
+      <p:cxnSp>
+        <p:nvCxnSpPr>
+          <p:cNvPr id="72" name="Elbow Connector 71"/>
+          <p:cNvCxnSpPr>
+            <a:stCxn id="78" idx="3"/>
+            <a:endCxn id="67" idx="1"/>
+          </p:cNvCxnSpPr>
+          <p:nvPr/>
+        </p:nvCxnSpPr>
+        <p:spPr>
+          <a:xfrm>
+            <a:off x="6450965" y="1553321"/>
+            <a:ext cx="1117037" cy="801424"/>
+          </a:xfrm>
+          <a:prstGeom prst="bentConnector3">
+            <a:avLst>
+              <a:gd name="adj1" fmla="val 50000"/>
+            </a:avLst>
+          </a:prstGeom>
+          <a:ln w="19050">
+            <a:solidFill>
+              <a:srgbClr val="7030A0"/>
+            </a:solidFill>
+            <a:headEnd type="none" w="med" len="med"/>
+            <a:tailEnd type="arrow" w="med" len="med"/>
+          </a:ln>
+          <a:effectLst/>
+        </p:spPr>
+        <p:style>
+          <a:lnRef idx="1">
+            <a:schemeClr val="accent2"/>
+          </a:lnRef>
+          <a:fillRef idx="2">
+            <a:schemeClr val="accent2"/>
+          </a:fillRef>
+          <a:effectRef idx="1">
+            <a:schemeClr val="accent2"/>
+          </a:effectRef>
+          <a:fontRef idx="minor">
+            <a:schemeClr val="dk1"/>
+          </a:fontRef>
+        </p:style>
+      </p:cxnSp>
+      <p:sp>
+        <p:nvSpPr>
+          <p:cNvPr id="73" name="TextBox 72"/>
+          <p:cNvSpPr txBox="1"/>
+          <p:nvPr/>
+        </p:nvSpPr>
+        <p:spPr>
+          <a:xfrm>
+            <a:off x="7115897" y="2218255"/>
+            <a:ext cx="189257" cy="178683"/>
+          </a:xfrm>
+          <a:prstGeom prst="rect">
+            <a:avLst/>
+          </a:prstGeom>
+          <a:noFill/>
+        </p:spPr>
+        <p:txBody>
+          <a:bodyPr wrap="square" lIns="0" tIns="0" rIns="0" bIns="0" rtlCol="0">
+            <a:noAutofit/>
+          </a:bodyPr>
+          <a:lstStyle/>
+          <a:p>
+            <a:pPr algn="ctr"/>
+            <a:r>
+              <a:rPr lang="en-US" sz="1100" dirty="0">
+                <a:solidFill>
+                  <a:srgbClr val="7030A0"/>
+                </a:solidFill>
+              </a:rPr>
+              <a:t>*</a:t>
+            </a:r>
+            <a:endParaRPr lang="en-SG" sz="1100" dirty="0">
+              <a:solidFill>
+                <a:srgbClr val="7030A0"/>
+              </a:solidFill>
+            </a:endParaRPr>
+          </a:p>
+        </p:txBody>
+      </p:sp>
+      <p:sp>
+        <p:nvSpPr>
+          <p:cNvPr id="74" name="Rectangle 8"/>
           <p:cNvSpPr/>
           <p:nvPr/>
         </p:nvSpPr>
         <p:spPr>
           <a:xfrm>
-            <a:off x="7712397" y="3533171"/>
-            <a:ext cx="708186" cy="285783"/>
+            <a:off x="1989988" y="2600388"/>
+            <a:ext cx="1490560" cy="334856"/>
           </a:xfrm>
           <a:prstGeom prst="rect">
             <a:avLst/>
@@ -4718,12 +5982,12 @@
           <a:p>
             <a:pPr algn="ctr"/>
             <a:r>
-              <a:rPr lang="en-US" sz="1050" dirty="0">
+              <a:rPr lang="en-US" sz="1050" dirty="0" err="1" smtClean="0">
                 <a:solidFill>
                   <a:srgbClr val="7030A0"/>
                 </a:solidFill>
               </a:rPr>
-              <a:t>Address</a:t>
+              <a:t>VersionedUsersList</a:t>
             </a:r>
             <a:endParaRPr lang="en-SG" sz="1050" dirty="0">
               <a:solidFill>
@@ -4735,19 +5999,16 @@
       </p:sp>
       <p:cxnSp>
         <p:nvCxnSpPr>
-          <p:cNvPr id="86" name="Elbow Connector 85"/>
-          <p:cNvCxnSpPr>
-            <a:stCxn id="78" idx="3"/>
-            <a:endCxn id="85" idx="1"/>
-          </p:cNvCxnSpPr>
+          <p:cNvPr id="77" name="Straight Arrow Connector 76"/>
+          <p:cNvCxnSpPr/>
           <p:nvPr/>
         </p:nvCxnSpPr>
         <p:spPr>
           <a:xfrm>
-            <a:off x="7277995" y="3034891"/>
-            <a:ext cx="434402" cy="641172"/>
-          </a:xfrm>
-          <a:prstGeom prst="bentConnector3">
+            <a:off x="1789068" y="2773884"/>
+            <a:ext cx="200920" cy="10557"/>
+          </a:xfrm>
+          <a:prstGeom prst="straightConnector1">
             <a:avLst/>
           </a:prstGeom>
           <a:ln w="19050">
@@ -4774,61 +6035,102 @@
           </a:fontRef>
         </p:style>
       </p:cxnSp>
-      <p:cxnSp>
-        <p:nvCxnSpPr>
-          <p:cNvPr id="97" name="Elbow Connector 63"/>
-          <p:cNvCxnSpPr>
-            <a:stCxn id="99" idx="3"/>
-          </p:cNvCxnSpPr>
-          <p:nvPr/>
-        </p:nvCxnSpPr>
-        <p:spPr>
-          <a:xfrm rot="5400000">
-            <a:off x="3553611" y="2687559"/>
-            <a:ext cx="293825" cy="5938"/>
-          </a:xfrm>
-          <a:prstGeom prst="bentConnector3">
-            <a:avLst>
-              <a:gd name="adj1" fmla="val 50000"/>
-            </a:avLst>
-          </a:prstGeom>
+      <p:sp>
+        <p:nvSpPr>
+          <p:cNvPr id="82" name="Flowchart: Decision 96"/>
+          <p:cNvSpPr/>
+          <p:nvPr/>
+        </p:nvSpPr>
+        <p:spPr>
+          <a:xfrm>
+            <a:off x="1553020" y="2687194"/>
+            <a:ext cx="236048" cy="173380"/>
+          </a:xfrm>
+          <a:prstGeom prst="flowChartDecision">
+            <a:avLst/>
+          </a:prstGeom>
+          <a:noFill/>
           <a:ln w="19050">
             <a:solidFill>
               <a:srgbClr val="7030A0"/>
             </a:solidFill>
-            <a:prstDash val="sysDot"/>
-            <a:headEnd type="none" w="med" len="med"/>
-            <a:tailEnd type="none" w="med" len="med"/>
           </a:ln>
           <a:effectLst/>
         </p:spPr>
         <p:style>
           <a:lnRef idx="1">
-            <a:schemeClr val="accent2"/>
+            <a:schemeClr val="accent6"/>
           </a:lnRef>
           <a:fillRef idx="2">
-            <a:schemeClr val="accent2"/>
+            <a:schemeClr val="accent6"/>
           </a:fillRef>
           <a:effectRef idx="1">
-            <a:schemeClr val="accent2"/>
+            <a:schemeClr val="accent6"/>
           </a:effectRef>
           <a:fontRef idx="minor">
             <a:schemeClr val="dk1"/>
           </a:fontRef>
         </p:style>
-      </p:cxnSp>
-      <p:sp>
-        <p:nvSpPr>
-          <p:cNvPr id="99" name="Isosceles Triangle 102"/>
+        <p:txBody>
+          <a:bodyPr rtlCol="0" anchor="ctr"/>
+          <a:lstStyle/>
+          <a:p>
+            <a:pPr algn="ctr"/>
+            <a:endParaRPr lang="en-US" sz="1050"/>
+          </a:p>
+        </p:txBody>
+      </p:sp>
+      <p:sp>
+        <p:nvSpPr>
+          <p:cNvPr id="87" name="TextBox 86"/>
+          <p:cNvSpPr txBox="1"/>
+          <p:nvPr/>
+        </p:nvSpPr>
+        <p:spPr>
+          <a:xfrm>
+            <a:off x="1738102" y="2527566"/>
+            <a:ext cx="170110" cy="137542"/>
+          </a:xfrm>
+          <a:prstGeom prst="rect">
+            <a:avLst/>
+          </a:prstGeom>
+          <a:noFill/>
+        </p:spPr>
+        <p:txBody>
+          <a:bodyPr wrap="square" lIns="0" tIns="0" rIns="0" bIns="0" rtlCol="0">
+            <a:noAutofit/>
+          </a:bodyPr>
+          <a:lstStyle/>
+          <a:p>
+            <a:pPr algn="ctr"/>
+            <a:r>
+              <a:rPr lang="en-US" sz="1100" dirty="0">
+                <a:solidFill>
+                  <a:srgbClr val="7030A0"/>
+                </a:solidFill>
+              </a:rPr>
+              <a:t>1</a:t>
+            </a:r>
+            <a:endParaRPr lang="en-SG" sz="1100" dirty="0">
+              <a:solidFill>
+                <a:srgbClr val="7030A0"/>
+              </a:solidFill>
+            </a:endParaRPr>
+          </a:p>
+        </p:txBody>
+      </p:sp>
+      <p:sp>
+        <p:nvSpPr>
+          <p:cNvPr id="89" name="Rectangle 8"/>
           <p:cNvSpPr/>
           <p:nvPr/>
         </p:nvSpPr>
         <p:spPr>
-          <a:xfrm rot="10800000" flipV="1">
-            <a:off x="3562299" y="2386554"/>
-            <a:ext cx="282387" cy="157062"/>
-          </a:xfrm>
-          <a:prstGeom prst="triangle">
+          <a:xfrm>
+            <a:off x="3845287" y="2609586"/>
+            <a:ext cx="1156969" cy="346760"/>
+          </a:xfrm>
+          <a:prstGeom prst="rect">
             <a:avLst/>
           </a:prstGeom>
           <a:ln w="19050">
@@ -4857,9 +6159,17 @@
           <a:lstStyle/>
           <a:p>
             <a:pPr algn="ctr"/>
-            <a:endParaRPr lang="en-SG" sz="1050" b="1">
+            <a:r>
+              <a:rPr lang="en-US" sz="1050" dirty="0" err="1" smtClean="0">
+                <a:solidFill>
+                  <a:srgbClr val="7030A0"/>
+                </a:solidFill>
+              </a:rPr>
+              <a:t>UniqueUserList</a:t>
+            </a:r>
+            <a:endParaRPr lang="en-SG" sz="1050" dirty="0">
               <a:solidFill>
-                <a:srgbClr val="92D050"/>
+                <a:srgbClr val="7030A0"/>
               </a:solidFill>
             </a:endParaRPr>
           </a:p>
@@ -4867,14 +6177,61 @@
       </p:sp>
       <p:sp>
         <p:nvSpPr>
-          <p:cNvPr id="100" name="Rectangle 8"/>
+          <p:cNvPr id="90" name="Flowchart: Decision 96"/>
           <p:cNvSpPr/>
           <p:nvPr/>
         </p:nvSpPr>
         <p:spPr>
           <a:xfrm>
-            <a:off x="1260922" y="1998350"/>
-            <a:ext cx="1443661" cy="364396"/>
+            <a:off x="3495234" y="2690750"/>
+            <a:ext cx="236048" cy="173380"/>
+          </a:xfrm>
+          <a:prstGeom prst="flowChartDecision">
+            <a:avLst/>
+          </a:prstGeom>
+          <a:solidFill>
+            <a:srgbClr val="7030A0"/>
+          </a:solidFill>
+          <a:ln w="19050">
+            <a:solidFill>
+              <a:srgbClr val="7030A0"/>
+            </a:solidFill>
+          </a:ln>
+          <a:effectLst/>
+        </p:spPr>
+        <p:style>
+          <a:lnRef idx="1">
+            <a:schemeClr val="accent6"/>
+          </a:lnRef>
+          <a:fillRef idx="2">
+            <a:schemeClr val="accent6"/>
+          </a:fillRef>
+          <a:effectRef idx="1">
+            <a:schemeClr val="accent6"/>
+          </a:effectRef>
+          <a:fontRef idx="minor">
+            <a:schemeClr val="dk1"/>
+          </a:fontRef>
+        </p:style>
+        <p:txBody>
+          <a:bodyPr rtlCol="0" anchor="ctr"/>
+          <a:lstStyle/>
+          <a:p>
+            <a:pPr algn="ctr"/>
+            <a:endParaRPr lang="en-US" sz="1050"/>
+          </a:p>
+        </p:txBody>
+      </p:sp>
+      <p:sp>
+        <p:nvSpPr>
+          <p:cNvPr id="91" name="Rectangle 8"/>
+          <p:cNvSpPr/>
+          <p:nvPr/>
+        </p:nvSpPr>
+        <p:spPr>
+          <a:xfrm>
+            <a:off x="5466314" y="2621490"/>
+            <a:ext cx="708186" cy="346760"/>
           </a:xfrm>
           <a:prstGeom prst="rect">
             <a:avLst/>
@@ -4906,27 +6263,12 @@
           <a:p>
             <a:pPr algn="ctr"/>
             <a:r>
-              <a:rPr lang="en-US" sz="1050" dirty="0">
+              <a:rPr lang="en-US" sz="1050" dirty="0" smtClean="0">
                 <a:solidFill>
                   <a:srgbClr val="7030A0"/>
                 </a:solidFill>
               </a:rPr>
-              <a:t>&lt;&lt;interface&gt;&gt;</a:t>
-            </a:r>
-            <a:br>
-              <a:rPr lang="en-US" sz="1050" dirty="0">
-                <a:solidFill>
-                  <a:srgbClr val="7030A0"/>
-                </a:solidFill>
-              </a:rPr>
-            </a:br>
-            <a:r>
-              <a:rPr lang="en-US" sz="1050" dirty="0" err="1">
-                <a:solidFill>
-                  <a:srgbClr val="7030A0"/>
-                </a:solidFill>
-              </a:rPr>
-              <a:t>ReadOnlyAddressBook</a:t>
+              <a:t>User</a:t>
             </a:r>
             <a:endParaRPr lang="en-SG" sz="1050" dirty="0">
               <a:solidFill>
@@ -4938,14 +6280,97 @@
       </p:sp>
       <p:sp>
         <p:nvSpPr>
-          <p:cNvPr id="114" name="TextBox 113"/>
+          <p:cNvPr id="92" name="Flowchart: Decision 96"/>
+          <p:cNvSpPr/>
+          <p:nvPr/>
+        </p:nvSpPr>
+        <p:spPr>
+          <a:xfrm>
+            <a:off x="5011388" y="2705100"/>
+            <a:ext cx="236048" cy="173380"/>
+          </a:xfrm>
+          <a:prstGeom prst="flowChartDecision">
+            <a:avLst/>
+          </a:prstGeom>
+          <a:noFill/>
+          <a:ln w="19050">
+            <a:solidFill>
+              <a:srgbClr val="7030A0"/>
+            </a:solidFill>
+          </a:ln>
+          <a:effectLst/>
+        </p:spPr>
+        <p:style>
+          <a:lnRef idx="1">
+            <a:schemeClr val="accent6"/>
+          </a:lnRef>
+          <a:fillRef idx="2">
+            <a:schemeClr val="accent6"/>
+          </a:fillRef>
+          <a:effectRef idx="1">
+            <a:schemeClr val="accent6"/>
+          </a:effectRef>
+          <a:fontRef idx="minor">
+            <a:schemeClr val="dk1"/>
+          </a:fontRef>
+        </p:style>
+        <p:txBody>
+          <a:bodyPr rtlCol="0" anchor="ctr"/>
+          <a:lstStyle/>
+          <a:p>
+            <a:pPr algn="ctr"/>
+            <a:endParaRPr lang="en-US" sz="1050"/>
+          </a:p>
+        </p:txBody>
+      </p:sp>
+      <p:cxnSp>
+        <p:nvCxnSpPr>
+          <p:cNvPr id="93" name="Elbow Connector 92"/>
+          <p:cNvCxnSpPr/>
+          <p:nvPr/>
+        </p:nvCxnSpPr>
+        <p:spPr>
+          <a:xfrm>
+            <a:off x="5247436" y="2789567"/>
+            <a:ext cx="218878" cy="3080"/>
+          </a:xfrm>
+          <a:prstGeom prst="bentConnector3">
+            <a:avLst/>
+          </a:prstGeom>
+          <a:ln w="19050">
+            <a:solidFill>
+              <a:srgbClr val="7030A0"/>
+            </a:solidFill>
+            <a:headEnd type="none" w="med" len="med"/>
+            <a:tailEnd type="arrow" w="med" len="med"/>
+          </a:ln>
+          <a:effectLst/>
+        </p:spPr>
+        <p:style>
+          <a:lnRef idx="1">
+            <a:schemeClr val="accent2"/>
+          </a:lnRef>
+          <a:fillRef idx="2">
+            <a:schemeClr val="accent2"/>
+          </a:fillRef>
+          <a:effectRef idx="1">
+            <a:schemeClr val="accent2"/>
+          </a:effectRef>
+          <a:fontRef idx="minor">
+            <a:schemeClr val="dk1"/>
+          </a:fontRef>
+        </p:style>
+      </p:cxnSp>
+      <p:sp>
+        <p:nvSpPr>
+          <p:cNvPr id="94" name="TextBox 93"/>
           <p:cNvSpPr txBox="1"/>
           <p:nvPr/>
         </p:nvSpPr>
         <p:spPr>
-          <a:xfrm rot="16200000">
-            <a:off x="6362886" y="3586305"/>
-            <a:ext cx="881018" cy="261610"/>
+          <a:xfrm>
+            <a:off x="3582616" y="2874903"/>
+            <a:ext cx="189257" cy="178683"/>
           </a:xfrm>
           <a:prstGeom prst="rect">
             <a:avLst/>
@@ -4953,19 +6378,19 @@
           <a:noFill/>
         </p:spPr>
         <p:txBody>
-          <a:bodyPr wrap="square" rtlCol="0">
-            <a:spAutoFit/>
+          <a:bodyPr wrap="square" lIns="0" tIns="0" rIns="0" bIns="0" rtlCol="0">
+            <a:noAutofit/>
           </a:bodyPr>
           <a:lstStyle/>
           <a:p>
-            <a:pPr algn="r"/>
+            <a:pPr algn="ctr"/>
             <a:r>
               <a:rPr lang="en-US" sz="1100" dirty="0">
                 <a:solidFill>
                   <a:srgbClr val="7030A0"/>
                 </a:solidFill>
               </a:rPr>
-              <a:t>filtered list</a:t>
+              <a:t>1</a:t>
             </a:r>
             <a:endParaRPr lang="en-SG" sz="1100" dirty="0">
               <a:solidFill>
@@ -4977,14 +6402,138 @@
       </p:sp>
       <p:sp>
         <p:nvSpPr>
-          <p:cNvPr id="122" name="Rectangle 8"/>
+          <p:cNvPr id="95" name="TextBox 94"/>
+          <p:cNvSpPr txBox="1"/>
+          <p:nvPr/>
+        </p:nvSpPr>
+        <p:spPr>
+          <a:xfrm>
+            <a:off x="5287893" y="2861341"/>
+            <a:ext cx="189257" cy="178683"/>
+          </a:xfrm>
+          <a:prstGeom prst="rect">
+            <a:avLst/>
+          </a:prstGeom>
+          <a:noFill/>
+        </p:spPr>
+        <p:txBody>
+          <a:bodyPr wrap="square" lIns="0" tIns="0" rIns="0" bIns="0" rtlCol="0">
+            <a:noAutofit/>
+          </a:bodyPr>
+          <a:lstStyle/>
+          <a:p>
+            <a:pPr algn="ctr"/>
+            <a:r>
+              <a:rPr lang="en-US" sz="1100" dirty="0">
+                <a:solidFill>
+                  <a:srgbClr val="7030A0"/>
+                </a:solidFill>
+              </a:rPr>
+              <a:t>*</a:t>
+            </a:r>
+            <a:endParaRPr lang="en-SG" sz="1100" dirty="0">
+              <a:solidFill>
+                <a:srgbClr val="7030A0"/>
+              </a:solidFill>
+            </a:endParaRPr>
+          </a:p>
+        </p:txBody>
+      </p:sp>
+      <p:cxnSp>
+        <p:nvCxnSpPr>
+          <p:cNvPr id="96" name="Straight Arrow Connector 95"/>
+          <p:cNvCxnSpPr/>
+          <p:nvPr/>
+        </p:nvCxnSpPr>
+        <p:spPr>
+          <a:xfrm>
+            <a:off x="3477609" y="2770646"/>
+            <a:ext cx="367678" cy="12320"/>
+          </a:xfrm>
+          <a:prstGeom prst="straightConnector1">
+            <a:avLst/>
+          </a:prstGeom>
+          <a:ln w="19050">
+            <a:solidFill>
+              <a:srgbClr val="7030A0"/>
+            </a:solidFill>
+            <a:headEnd type="none" w="med" len="med"/>
+            <a:tailEnd type="arrow" w="med" len="med"/>
+          </a:ln>
+          <a:effectLst/>
+        </p:spPr>
+        <p:style>
+          <a:lnRef idx="1">
+            <a:schemeClr val="accent2"/>
+          </a:lnRef>
+          <a:fillRef idx="2">
+            <a:schemeClr val="accent2"/>
+          </a:fillRef>
+          <a:effectRef idx="1">
+            <a:schemeClr val="accent2"/>
+          </a:effectRef>
+          <a:fontRef idx="minor">
+            <a:schemeClr val="dk1"/>
+          </a:fontRef>
+        </p:style>
+      </p:cxnSp>
+      <p:sp>
+        <p:nvSpPr>
+          <p:cNvPr id="98" name="Flowchart: Decision 96"/>
           <p:cNvSpPr/>
           <p:nvPr/>
         </p:nvSpPr>
         <p:spPr>
           <a:xfrm>
-            <a:off x="2057401" y="4239491"/>
-            <a:ext cx="1066800" cy="346760"/>
+            <a:off x="6174500" y="2705100"/>
+            <a:ext cx="236048" cy="173380"/>
+          </a:xfrm>
+          <a:prstGeom prst="flowChartDecision">
+            <a:avLst/>
+          </a:prstGeom>
+          <a:solidFill>
+            <a:srgbClr val="7030A0"/>
+          </a:solidFill>
+          <a:ln w="19050">
+            <a:solidFill>
+              <a:srgbClr val="7030A0"/>
+            </a:solidFill>
+          </a:ln>
+          <a:effectLst/>
+        </p:spPr>
+        <p:style>
+          <a:lnRef idx="1">
+            <a:schemeClr val="accent6"/>
+          </a:lnRef>
+          <a:fillRef idx="2">
+            <a:schemeClr val="accent6"/>
+          </a:fillRef>
+          <a:effectRef idx="1">
+            <a:schemeClr val="accent6"/>
+          </a:effectRef>
+          <a:fontRef idx="minor">
+            <a:schemeClr val="dk1"/>
+          </a:fontRef>
+        </p:style>
+        <p:txBody>
+          <a:bodyPr rtlCol="0" anchor="ctr"/>
+          <a:lstStyle/>
+          <a:p>
+            <a:pPr algn="ctr"/>
+            <a:endParaRPr lang="en-US" sz="1050"/>
+          </a:p>
+        </p:txBody>
+      </p:sp>
+      <p:sp>
+        <p:nvSpPr>
+          <p:cNvPr id="101" name="Rectangle 8"/>
+          <p:cNvSpPr/>
+          <p:nvPr/>
+        </p:nvSpPr>
+        <p:spPr>
+          <a:xfrm>
+            <a:off x="7568002" y="2651600"/>
+            <a:ext cx="898202" cy="285783"/>
           </a:xfrm>
           <a:prstGeom prst="rect">
             <a:avLst/>
@@ -5016,35 +6565,12 @@
           <a:p>
             <a:pPr algn="ctr"/>
             <a:r>
-              <a:rPr lang="en-US" sz="1050" dirty="0">
+              <a:rPr lang="en-US" sz="1050" dirty="0" smtClean="0">
                 <a:solidFill>
                   <a:srgbClr val="7030A0"/>
                 </a:solidFill>
               </a:rPr>
-              <a:t>&lt;&lt;interface&gt;&gt;</a:t>
-            </a:r>
-            <a:r>
-              <a:rPr lang="en-US" sz="1050">
-                <a:solidFill>
-                  <a:srgbClr val="7030A0"/>
-                </a:solidFill>
-              </a:rPr>
-              <a:t/>
-            </a:r>
-            <a:br>
-              <a:rPr lang="en-US" sz="1050">
-                <a:solidFill>
-                  <a:srgbClr val="7030A0"/>
-                </a:solidFill>
-              </a:rPr>
-            </a:br>
-            <a:r>
-              <a:rPr lang="en-US" sz="1050" dirty="0" err="1">
-                <a:solidFill>
-                  <a:srgbClr val="7030A0"/>
-                </a:solidFill>
-              </a:rPr>
-              <a:t>ObservableList</a:t>
+              <a:t>Name</a:t>
             </a:r>
             <a:endParaRPr lang="en-SG" sz="1050" dirty="0">
               <a:solidFill>
@@ -5054,259 +6580,16 @@
           </a:p>
         </p:txBody>
       </p:sp>
-      <p:cxnSp>
-        <p:nvCxnSpPr>
-          <p:cNvPr id="124" name="Elbow Connector 122"/>
-          <p:cNvCxnSpPr>
-            <a:stCxn id="119" idx="1"/>
-            <a:endCxn id="122" idx="1"/>
-          </p:cNvCxnSpPr>
-          <p:nvPr/>
-        </p:nvCxnSpPr>
-        <p:spPr>
-          <a:xfrm rot="16200000" flipH="1">
-            <a:off x="1364475" y="3719944"/>
-            <a:ext cx="831471" cy="554381"/>
-          </a:xfrm>
-          <a:prstGeom prst="bentConnector2">
-            <a:avLst/>
-          </a:prstGeom>
-          <a:ln w="19050">
-            <a:solidFill>
-              <a:srgbClr val="7030A0"/>
-            </a:solidFill>
-            <a:prstDash val="sysDot"/>
-            <a:headEnd type="none" w="med" len="med"/>
-            <a:tailEnd type="arrow" w="med" len="med"/>
-          </a:ln>
-          <a:effectLst/>
-        </p:spPr>
-        <p:style>
-          <a:lnRef idx="1">
-            <a:schemeClr val="accent2"/>
-          </a:lnRef>
-          <a:fillRef idx="2">
-            <a:schemeClr val="accent2"/>
-          </a:fillRef>
-          <a:effectRef idx="1">
-            <a:schemeClr val="accent2"/>
-          </a:effectRef>
-          <a:fontRef idx="minor">
-            <a:schemeClr val="dk1"/>
-          </a:fontRef>
-        </p:style>
-      </p:cxnSp>
-      <p:sp>
-        <p:nvSpPr>
-          <p:cNvPr id="54" name="TextBox 53"/>
-          <p:cNvSpPr txBox="1"/>
-          <p:nvPr/>
-        </p:nvSpPr>
-        <p:spPr>
-          <a:xfrm>
-            <a:off x="4429979" y="3111479"/>
-            <a:ext cx="189257" cy="178683"/>
-          </a:xfrm>
-          <a:prstGeom prst="rect">
-            <a:avLst/>
-          </a:prstGeom>
-          <a:noFill/>
-        </p:spPr>
-        <p:txBody>
-          <a:bodyPr wrap="square" lIns="0" tIns="0" rIns="0" bIns="0" rtlCol="0">
-            <a:noAutofit/>
-          </a:bodyPr>
-          <a:lstStyle/>
-          <a:p>
-            <a:pPr algn="ctr"/>
-            <a:r>
-              <a:rPr lang="en-US" sz="1100" dirty="0">
-                <a:solidFill>
-                  <a:srgbClr val="7030A0"/>
-                </a:solidFill>
-              </a:rPr>
-              <a:t>1</a:t>
-            </a:r>
-            <a:endParaRPr lang="en-SG" sz="1100" dirty="0">
-              <a:solidFill>
-                <a:srgbClr val="7030A0"/>
-              </a:solidFill>
-            </a:endParaRPr>
-          </a:p>
-        </p:txBody>
-      </p:sp>
-      <p:sp>
-        <p:nvSpPr>
-          <p:cNvPr id="61" name="TextBox 60"/>
-          <p:cNvSpPr txBox="1"/>
-          <p:nvPr/>
-        </p:nvSpPr>
-        <p:spPr>
-          <a:xfrm>
-            <a:off x="6135256" y="3097917"/>
-            <a:ext cx="189257" cy="178683"/>
-          </a:xfrm>
-          <a:prstGeom prst="rect">
-            <a:avLst/>
-          </a:prstGeom>
-          <a:noFill/>
-        </p:spPr>
-        <p:txBody>
-          <a:bodyPr wrap="square" lIns="0" tIns="0" rIns="0" bIns="0" rtlCol="0">
-            <a:noAutofit/>
-          </a:bodyPr>
-          <a:lstStyle/>
-          <a:p>
-            <a:pPr algn="ctr"/>
-            <a:r>
-              <a:rPr lang="en-US" sz="1100" dirty="0">
-                <a:solidFill>
-                  <a:srgbClr val="7030A0"/>
-                </a:solidFill>
-              </a:rPr>
-              <a:t>*</a:t>
-            </a:r>
-            <a:endParaRPr lang="en-SG" sz="1100" dirty="0">
-              <a:solidFill>
-                <a:srgbClr val="7030A0"/>
-              </a:solidFill>
-            </a:endParaRPr>
-          </a:p>
-        </p:txBody>
-      </p:sp>
-      <p:sp>
-        <p:nvSpPr>
-          <p:cNvPr id="65" name="TextBox 64"/>
-          <p:cNvSpPr txBox="1"/>
-          <p:nvPr/>
-        </p:nvSpPr>
-        <p:spPr>
-          <a:xfrm>
-            <a:off x="2573394" y="2756715"/>
-            <a:ext cx="170110" cy="137542"/>
-          </a:xfrm>
-          <a:prstGeom prst="rect">
-            <a:avLst/>
-          </a:prstGeom>
-          <a:noFill/>
-        </p:spPr>
-        <p:txBody>
-          <a:bodyPr wrap="square" lIns="0" tIns="0" rIns="0" bIns="0" rtlCol="0">
-            <a:noAutofit/>
-          </a:bodyPr>
-          <a:lstStyle/>
-          <a:p>
-            <a:pPr algn="ctr"/>
-            <a:r>
-              <a:rPr lang="en-US" sz="1100" dirty="0">
-                <a:solidFill>
-                  <a:srgbClr val="7030A0"/>
-                </a:solidFill>
-              </a:rPr>
-              <a:t>1</a:t>
-            </a:r>
-            <a:endParaRPr lang="en-SG" sz="1100" dirty="0">
-              <a:solidFill>
-                <a:srgbClr val="7030A0"/>
-              </a:solidFill>
-            </a:endParaRPr>
-          </a:p>
-        </p:txBody>
-      </p:sp>
-      <p:sp>
-        <p:nvSpPr>
-          <p:cNvPr id="66" name="TextBox 65"/>
-          <p:cNvSpPr txBox="1"/>
-          <p:nvPr/>
-        </p:nvSpPr>
-        <p:spPr>
-          <a:xfrm>
-            <a:off x="2707070" y="3667737"/>
-            <a:ext cx="189257" cy="178683"/>
-          </a:xfrm>
-          <a:prstGeom prst="rect">
-            <a:avLst/>
-          </a:prstGeom>
-          <a:noFill/>
-        </p:spPr>
-        <p:txBody>
-          <a:bodyPr wrap="square" lIns="0" tIns="0" rIns="0" bIns="0" rtlCol="0">
-            <a:noAutofit/>
-          </a:bodyPr>
-          <a:lstStyle/>
-          <a:p>
-            <a:pPr algn="ctr"/>
-            <a:r>
-              <a:rPr lang="en-US" sz="1100" dirty="0">
-                <a:solidFill>
-                  <a:srgbClr val="7030A0"/>
-                </a:solidFill>
-              </a:rPr>
-              <a:t>1</a:t>
-            </a:r>
-            <a:endParaRPr lang="en-SG" sz="1100" dirty="0">
-              <a:solidFill>
-                <a:srgbClr val="7030A0"/>
-              </a:solidFill>
-            </a:endParaRPr>
-          </a:p>
-        </p:txBody>
-      </p:sp>
-      <p:sp>
-        <p:nvSpPr>
-          <p:cNvPr id="70" name="TextBox 69"/>
-          <p:cNvSpPr txBox="1"/>
-          <p:nvPr/>
-        </p:nvSpPr>
-        <p:spPr>
-          <a:xfrm>
-            <a:off x="6449896" y="3204826"/>
-            <a:ext cx="189257" cy="178683"/>
-          </a:xfrm>
-          <a:prstGeom prst="rect">
-            <a:avLst/>
-          </a:prstGeom>
-          <a:noFill/>
-        </p:spPr>
-        <p:txBody>
-          <a:bodyPr wrap="square" lIns="0" tIns="0" rIns="0" bIns="0" rtlCol="0">
-            <a:noAutofit/>
-          </a:bodyPr>
-          <a:lstStyle/>
-          <a:p>
-            <a:pPr algn="ctr"/>
-            <a:r>
-              <a:rPr lang="en-US" sz="1100" dirty="0">
-                <a:solidFill>
-                  <a:srgbClr val="7030A0"/>
-                </a:solidFill>
-              </a:rPr>
-              <a:t>1</a:t>
-            </a:r>
-            <a:endParaRPr lang="en-SG" sz="1100" dirty="0">
-              <a:solidFill>
-                <a:srgbClr val="7030A0"/>
-              </a:solidFill>
-            </a:endParaRPr>
-          </a:p>
-        </p:txBody>
-      </p:sp>
-      <p:sp>
-        <p:nvSpPr>
-          <p:cNvPr id="52" name="Rectangle 8">
-            <a:extLst>
-              <a:ext uri="{FF2B5EF4-FFF2-40B4-BE49-F238E27FC236}">
-                <a16:creationId xmlns:a16="http://schemas.microsoft.com/office/drawing/2014/main" id="{ABDCDBD2-131A-4B66-A2F2-43BBEE82C773}"/>
-              </a:ext>
-            </a:extLst>
-          </p:cNvPr>
+      <p:sp>
+        <p:nvSpPr>
+          <p:cNvPr id="102" name="Rectangle 8"/>
           <p:cNvSpPr/>
           <p:nvPr/>
         </p:nvSpPr>
         <p:spPr>
           <a:xfrm>
-            <a:off x="7712397" y="2228817"/>
-            <a:ext cx="708186" cy="285783"/>
+            <a:off x="7568002" y="3042163"/>
+            <a:ext cx="898202" cy="285783"/>
           </a:xfrm>
           <a:prstGeom prst="rect">
             <a:avLst/>
@@ -5338,12 +6621,12 @@
           <a:p>
             <a:pPr algn="ctr"/>
             <a:r>
-              <a:rPr lang="en-US" sz="1050" dirty="0">
+              <a:rPr lang="en-US" sz="1050" dirty="0" smtClean="0">
                 <a:solidFill>
                   <a:srgbClr val="7030A0"/>
                 </a:solidFill>
               </a:rPr>
-              <a:t>Tag</a:t>
+              <a:t>Username</a:t>
             </a:r>
             <a:endParaRPr lang="en-SG" sz="1050" dirty="0">
               <a:solidFill>
@@ -5353,111 +6636,16 @@
           </a:p>
         </p:txBody>
       </p:sp>
-      <p:cxnSp>
-        <p:nvCxnSpPr>
-          <p:cNvPr id="53" name="Elbow Connector 78">
-            <a:extLst>
-              <a:ext uri="{FF2B5EF4-FFF2-40B4-BE49-F238E27FC236}">
-                <a16:creationId xmlns:a16="http://schemas.microsoft.com/office/drawing/2014/main" id="{B97967F8-618A-448B-81FD-CDFD4AF0EC64}"/>
-              </a:ext>
-            </a:extLst>
-          </p:cNvPr>
-          <p:cNvCxnSpPr>
-            <a:cxnSpLocks/>
-            <a:stCxn id="78" idx="3"/>
-            <a:endCxn id="52" idx="1"/>
-          </p:cNvCxnSpPr>
-          <p:nvPr/>
-        </p:nvCxnSpPr>
-        <p:spPr>
-          <a:xfrm flipV="1">
-            <a:off x="7277995" y="2371709"/>
-            <a:ext cx="434402" cy="663182"/>
-          </a:xfrm>
-          <a:prstGeom prst="bentConnector3">
-            <a:avLst>
-              <a:gd name="adj1" fmla="val 50000"/>
-            </a:avLst>
-          </a:prstGeom>
-          <a:ln w="19050">
-            <a:solidFill>
-              <a:srgbClr val="7030A0"/>
-            </a:solidFill>
-            <a:headEnd type="none" w="med" len="med"/>
-            <a:tailEnd type="arrow" w="med" len="med"/>
-          </a:ln>
-          <a:effectLst/>
-        </p:spPr>
-        <p:style>
-          <a:lnRef idx="1">
-            <a:schemeClr val="accent2"/>
-          </a:lnRef>
-          <a:fillRef idx="2">
-            <a:schemeClr val="accent2"/>
-          </a:fillRef>
-          <a:effectRef idx="1">
-            <a:schemeClr val="accent2"/>
-          </a:effectRef>
-          <a:fontRef idx="minor">
-            <a:schemeClr val="dk1"/>
-          </a:fontRef>
-        </p:style>
-      </p:cxnSp>
-      <p:sp>
-        <p:nvSpPr>
-          <p:cNvPr id="50" name="TextBox 49">
-            <a:extLst>
-              <a:ext uri="{FF2B5EF4-FFF2-40B4-BE49-F238E27FC236}">
-                <a16:creationId xmlns:a16="http://schemas.microsoft.com/office/drawing/2014/main" id="{B3FA9D57-880F-49C4-AD0B-A64E30D6F403}"/>
-              </a:ext>
-            </a:extLst>
-          </p:cNvPr>
-          <p:cNvSpPr txBox="1"/>
-          <p:nvPr/>
-        </p:nvSpPr>
-        <p:spPr>
-          <a:xfrm>
-            <a:off x="7466243" y="2255711"/>
-            <a:ext cx="189257" cy="178683"/>
-          </a:xfrm>
-          <a:prstGeom prst="rect">
-            <a:avLst/>
-          </a:prstGeom>
-          <a:noFill/>
-        </p:spPr>
-        <p:txBody>
-          <a:bodyPr wrap="square" lIns="0" tIns="0" rIns="0" bIns="0" rtlCol="0">
-            <a:noAutofit/>
-          </a:bodyPr>
-          <a:lstStyle/>
-          <a:p>
-            <a:pPr algn="ctr"/>
-            <a:r>
-              <a:rPr lang="en-US" sz="1100" dirty="0">
-                <a:solidFill>
-                  <a:srgbClr val="7030A0"/>
-                </a:solidFill>
-              </a:rPr>
-              <a:t>*</a:t>
-            </a:r>
-            <a:endParaRPr lang="en-SG" sz="1100" dirty="0">
-              <a:solidFill>
-                <a:srgbClr val="7030A0"/>
-              </a:solidFill>
-            </a:endParaRPr>
-          </a:p>
-        </p:txBody>
-      </p:sp>
-      <p:sp>
-        <p:nvSpPr>
-          <p:cNvPr id="55" name="Rectangle 8"/>
+      <p:sp>
+        <p:nvSpPr>
+          <p:cNvPr id="103" name="Rectangle 8"/>
           <p:cNvSpPr/>
           <p:nvPr/>
         </p:nvSpPr>
         <p:spPr>
           <a:xfrm>
-            <a:off x="3170181" y="1998350"/>
-            <a:ext cx="1060683" cy="364396"/>
+            <a:off x="7568002" y="3398231"/>
+            <a:ext cx="898202" cy="285783"/>
           </a:xfrm>
           <a:prstGeom prst="rect">
             <a:avLst/>
@@ -5489,12 +6677,12 @@
           <a:p>
             <a:pPr algn="ctr"/>
             <a:r>
-              <a:rPr lang="en-US" sz="1050" dirty="0" err="1">
+              <a:rPr lang="en-US" sz="1050" dirty="0" smtClean="0">
                 <a:solidFill>
                   <a:srgbClr val="7030A0"/>
                 </a:solidFill>
               </a:rPr>
-              <a:t>AddressBook</a:t>
+              <a:t>Password</a:t>
             </a:r>
             <a:endParaRPr lang="en-SG" sz="1050" dirty="0">
               <a:solidFill>
@@ -5506,20 +6694,22 @@
       </p:sp>
       <p:cxnSp>
         <p:nvCxnSpPr>
-          <p:cNvPr id="60" name="Straight Arrow Connector 59"/>
+          <p:cNvPr id="104" name="Elbow Connector 103"/>
           <p:cNvCxnSpPr>
-            <a:stCxn id="51" idx="1"/>
-            <a:endCxn id="49" idx="1"/>
+            <a:stCxn id="98" idx="3"/>
+            <a:endCxn id="101" idx="1"/>
           </p:cNvCxnSpPr>
           <p:nvPr/>
         </p:nvCxnSpPr>
         <p:spPr>
           <a:xfrm>
-            <a:off x="4324972" y="3007222"/>
-            <a:ext cx="367678" cy="12320"/>
-          </a:xfrm>
-          <a:prstGeom prst="straightConnector1">
-            <a:avLst/>
+            <a:off x="6410548" y="2791790"/>
+            <a:ext cx="1157454" cy="2702"/>
+          </a:xfrm>
+          <a:prstGeom prst="bentConnector3">
+            <a:avLst>
+              <a:gd name="adj1" fmla="val 50000"/>
+            </a:avLst>
           </a:prstGeom>
           <a:ln w="19050">
             <a:solidFill>
@@ -5545,27 +6735,689 @@
           </a:fontRef>
         </p:style>
       </p:cxnSp>
-      <p:sp>
-        <p:nvSpPr>
-          <p:cNvPr id="68" name="Isosceles Triangle 102"/>
+      <p:cxnSp>
+        <p:nvCxnSpPr>
+          <p:cNvPr id="105" name="Elbow Connector 104"/>
+          <p:cNvCxnSpPr>
+            <a:stCxn id="98" idx="3"/>
+            <a:endCxn id="102" idx="1"/>
+          </p:cNvCxnSpPr>
+          <p:nvPr/>
+        </p:nvCxnSpPr>
+        <p:spPr>
+          <a:xfrm>
+            <a:off x="6410548" y="2791790"/>
+            <a:ext cx="1157454" cy="393265"/>
+          </a:xfrm>
+          <a:prstGeom prst="bentConnector3">
+            <a:avLst>
+              <a:gd name="adj1" fmla="val 50000"/>
+            </a:avLst>
+          </a:prstGeom>
+          <a:ln w="19050">
+            <a:solidFill>
+              <a:srgbClr val="7030A0"/>
+            </a:solidFill>
+            <a:headEnd type="none" w="med" len="med"/>
+            <a:tailEnd type="arrow" w="med" len="med"/>
+          </a:ln>
+          <a:effectLst/>
+        </p:spPr>
+        <p:style>
+          <a:lnRef idx="1">
+            <a:schemeClr val="accent2"/>
+          </a:lnRef>
+          <a:fillRef idx="2">
+            <a:schemeClr val="accent2"/>
+          </a:fillRef>
+          <a:effectRef idx="1">
+            <a:schemeClr val="accent2"/>
+          </a:effectRef>
+          <a:fontRef idx="minor">
+            <a:schemeClr val="dk1"/>
+          </a:fontRef>
+        </p:style>
+      </p:cxnSp>
+      <p:cxnSp>
+        <p:nvCxnSpPr>
+          <p:cNvPr id="108" name="Elbow Connector 107"/>
+          <p:cNvCxnSpPr>
+            <a:stCxn id="98" idx="3"/>
+            <a:endCxn id="103" idx="1"/>
+          </p:cNvCxnSpPr>
+          <p:nvPr/>
+        </p:nvCxnSpPr>
+        <p:spPr>
+          <a:xfrm>
+            <a:off x="6410548" y="2791790"/>
+            <a:ext cx="1157454" cy="749333"/>
+          </a:xfrm>
+          <a:prstGeom prst="bentConnector3">
+            <a:avLst>
+              <a:gd name="adj1" fmla="val 50000"/>
+            </a:avLst>
+          </a:prstGeom>
+          <a:ln w="19050">
+            <a:solidFill>
+              <a:srgbClr val="7030A0"/>
+            </a:solidFill>
+            <a:headEnd type="none" w="med" len="med"/>
+            <a:tailEnd type="arrow" w="med" len="med"/>
+          </a:ln>
+          <a:effectLst/>
+        </p:spPr>
+        <p:style>
+          <a:lnRef idx="1">
+            <a:schemeClr val="accent2"/>
+          </a:lnRef>
+          <a:fillRef idx="2">
+            <a:schemeClr val="accent2"/>
+          </a:fillRef>
+          <a:effectRef idx="1">
+            <a:schemeClr val="accent2"/>
+          </a:effectRef>
+          <a:fontRef idx="minor">
+            <a:schemeClr val="dk1"/>
+          </a:fontRef>
+        </p:style>
+      </p:cxnSp>
+      <p:sp>
+        <p:nvSpPr>
+          <p:cNvPr id="111" name="Rectangle 8"/>
           <p:cNvSpPr/>
           <p:nvPr/>
         </p:nvSpPr>
         <p:spPr>
-          <a:xfrm rot="16200000">
-            <a:off x="2669073" y="2069158"/>
-            <a:ext cx="271014" cy="187417"/>
-          </a:xfrm>
-          <a:prstGeom prst="triangle">
-            <a:avLst>
-              <a:gd name="adj" fmla="val 44517"/>
-            </a:avLst>
+          <a:xfrm>
+            <a:off x="1998249" y="3746174"/>
+            <a:ext cx="1715407" cy="334856"/>
+          </a:xfrm>
+          <a:prstGeom prst="rect">
+            <a:avLst/>
+          </a:prstGeom>
+          <a:ln w="19050">
+            <a:solidFill>
+              <a:srgbClr val="7030A0"/>
+            </a:solidFill>
+          </a:ln>
+          <a:effectLst/>
+        </p:spPr>
+        <p:style>
+          <a:lnRef idx="1">
+            <a:schemeClr val="accent4"/>
+          </a:lnRef>
+          <a:fillRef idx="2">
+            <a:schemeClr val="accent4"/>
+          </a:fillRef>
+          <a:effectRef idx="1">
+            <a:schemeClr val="accent4"/>
+          </a:effectRef>
+          <a:fontRef idx="minor">
+            <a:schemeClr val="dk1"/>
+          </a:fontRef>
+        </p:style>
+        <p:txBody>
+          <a:bodyPr rtlCol="0" anchor="ctr"/>
+          <a:lstStyle/>
+          <a:p>
+            <a:pPr algn="ctr"/>
+            <a:r>
+              <a:rPr lang="en-US" sz="1050" smtClean="0">
+                <a:solidFill>
+                  <a:srgbClr val="7030A0"/>
+                </a:solidFill>
+              </a:rPr>
+              <a:t>VersionedDeliverymenList</a:t>
+            </a:r>
+            <a:endParaRPr lang="en-SG" sz="1050" dirty="0">
+              <a:solidFill>
+                <a:srgbClr val="7030A0"/>
+              </a:solidFill>
+            </a:endParaRPr>
+          </a:p>
+        </p:txBody>
+      </p:sp>
+      <p:grpSp>
+        <p:nvGrpSpPr>
+          <p:cNvPr id="43" name="Group 42"/>
+          <p:cNvGrpSpPr/>
+          <p:nvPr/>
+        </p:nvGrpSpPr>
+        <p:grpSpPr>
+          <a:xfrm>
+            <a:off x="1561282" y="3831450"/>
+            <a:ext cx="436968" cy="173380"/>
+            <a:chOff x="2388312" y="4956232"/>
+            <a:chExt cx="436968" cy="173380"/>
+          </a:xfrm>
+        </p:grpSpPr>
+        <p:cxnSp>
+          <p:nvCxnSpPr>
+            <p:cNvPr id="112" name="Straight Arrow Connector 111"/>
+            <p:cNvCxnSpPr/>
+            <p:nvPr/>
+          </p:nvCxnSpPr>
+          <p:spPr>
+            <a:xfrm>
+              <a:off x="2624360" y="5042922"/>
+              <a:ext cx="200920" cy="10557"/>
+            </a:xfrm>
+            <a:prstGeom prst="straightConnector1">
+              <a:avLst/>
+            </a:prstGeom>
+            <a:ln w="19050">
+              <a:solidFill>
+                <a:srgbClr val="7030A0"/>
+              </a:solidFill>
+              <a:headEnd type="none" w="med" len="med"/>
+              <a:tailEnd type="arrow" w="med" len="med"/>
+            </a:ln>
+            <a:effectLst/>
+          </p:spPr>
+          <p:style>
+            <a:lnRef idx="1">
+              <a:schemeClr val="accent2"/>
+            </a:lnRef>
+            <a:fillRef idx="2">
+              <a:schemeClr val="accent2"/>
+            </a:fillRef>
+            <a:effectRef idx="1">
+              <a:schemeClr val="accent2"/>
+            </a:effectRef>
+            <a:fontRef idx="minor">
+              <a:schemeClr val="dk1"/>
+            </a:fontRef>
+          </p:style>
+        </p:cxnSp>
+        <p:sp>
+          <p:nvSpPr>
+            <p:cNvPr id="113" name="Flowchart: Decision 96"/>
+            <p:cNvSpPr/>
+            <p:nvPr/>
+          </p:nvSpPr>
+          <p:spPr>
+            <a:xfrm>
+              <a:off x="2388312" y="4956232"/>
+              <a:ext cx="236048" cy="173380"/>
+            </a:xfrm>
+            <a:prstGeom prst="flowChartDecision">
+              <a:avLst/>
+            </a:prstGeom>
+            <a:noFill/>
+            <a:ln w="19050">
+              <a:solidFill>
+                <a:srgbClr val="7030A0"/>
+              </a:solidFill>
+            </a:ln>
+            <a:effectLst/>
+          </p:spPr>
+          <p:style>
+            <a:lnRef idx="1">
+              <a:schemeClr val="accent6"/>
+            </a:lnRef>
+            <a:fillRef idx="2">
+              <a:schemeClr val="accent6"/>
+            </a:fillRef>
+            <a:effectRef idx="1">
+              <a:schemeClr val="accent6"/>
+            </a:effectRef>
+            <a:fontRef idx="minor">
+              <a:schemeClr val="dk1"/>
+            </a:fontRef>
+          </p:style>
+          <p:txBody>
+            <a:bodyPr rtlCol="0" anchor="ctr"/>
+            <a:lstStyle/>
+            <a:p>
+              <a:pPr algn="ctr"/>
+              <a:endParaRPr lang="en-US" sz="1050"/>
+            </a:p>
+          </p:txBody>
+        </p:sp>
+      </p:grpSp>
+      <p:sp>
+        <p:nvSpPr>
+          <p:cNvPr id="115" name="TextBox 114"/>
+          <p:cNvSpPr txBox="1"/>
+          <p:nvPr/>
+        </p:nvSpPr>
+        <p:spPr>
+          <a:xfrm>
+            <a:off x="1740125" y="3684014"/>
+            <a:ext cx="170110" cy="137542"/>
+          </a:xfrm>
+          <a:prstGeom prst="rect">
+            <a:avLst/>
+          </a:prstGeom>
+          <a:noFill/>
+        </p:spPr>
+        <p:txBody>
+          <a:bodyPr wrap="square" lIns="0" tIns="0" rIns="0" bIns="0" rtlCol="0">
+            <a:noAutofit/>
+          </a:bodyPr>
+          <a:lstStyle/>
+          <a:p>
+            <a:pPr algn="ctr"/>
+            <a:r>
+              <a:rPr lang="en-US" sz="1100" dirty="0">
+                <a:solidFill>
+                  <a:srgbClr val="7030A0"/>
+                </a:solidFill>
+              </a:rPr>
+              <a:t>1</a:t>
+            </a:r>
+            <a:endParaRPr lang="en-SG" sz="1100" dirty="0">
+              <a:solidFill>
+                <a:srgbClr val="7030A0"/>
+              </a:solidFill>
+            </a:endParaRPr>
+          </a:p>
+        </p:txBody>
+      </p:sp>
+      <p:sp>
+        <p:nvSpPr>
+          <p:cNvPr id="116" name="Rectangle 8"/>
+          <p:cNvSpPr/>
+          <p:nvPr/>
+        </p:nvSpPr>
+        <p:spPr>
+          <a:xfrm>
+            <a:off x="4101486" y="3757080"/>
+            <a:ext cx="1521380" cy="346760"/>
+          </a:xfrm>
+          <a:prstGeom prst="rect">
+            <a:avLst/>
+          </a:prstGeom>
+          <a:ln w="19050">
+            <a:solidFill>
+              <a:srgbClr val="7030A0"/>
+            </a:solidFill>
+          </a:ln>
+          <a:effectLst/>
+        </p:spPr>
+        <p:style>
+          <a:lnRef idx="1">
+            <a:schemeClr val="accent4"/>
+          </a:lnRef>
+          <a:fillRef idx="2">
+            <a:schemeClr val="accent4"/>
+          </a:fillRef>
+          <a:effectRef idx="1">
+            <a:schemeClr val="accent4"/>
+          </a:effectRef>
+          <a:fontRef idx="minor">
+            <a:schemeClr val="dk1"/>
+          </a:fontRef>
+        </p:style>
+        <p:txBody>
+          <a:bodyPr rtlCol="0" anchor="ctr"/>
+          <a:lstStyle/>
+          <a:p>
+            <a:pPr algn="ctr"/>
+            <a:r>
+              <a:rPr lang="en-US" sz="1050" dirty="0" err="1" smtClean="0">
+                <a:solidFill>
+                  <a:srgbClr val="7030A0"/>
+                </a:solidFill>
+              </a:rPr>
+              <a:t>UniqueDeliverymenList</a:t>
+            </a:r>
+            <a:endParaRPr lang="en-SG" sz="1050" dirty="0">
+              <a:solidFill>
+                <a:srgbClr val="7030A0"/>
+              </a:solidFill>
+            </a:endParaRPr>
+          </a:p>
+        </p:txBody>
+      </p:sp>
+      <p:grpSp>
+        <p:nvGrpSpPr>
+          <p:cNvPr id="45" name="Group 44"/>
+          <p:cNvGrpSpPr/>
+          <p:nvPr/>
+        </p:nvGrpSpPr>
+        <p:grpSpPr>
+          <a:xfrm>
+            <a:off x="5624600" y="3842717"/>
+            <a:ext cx="454926" cy="173380"/>
+            <a:chOff x="6094617" y="4965056"/>
+            <a:chExt cx="454926" cy="173380"/>
+          </a:xfrm>
+        </p:grpSpPr>
+        <p:sp>
+          <p:nvSpPr>
+            <p:cNvPr id="121" name="Flowchart: Decision 96"/>
+            <p:cNvSpPr/>
+            <p:nvPr/>
+          </p:nvSpPr>
+          <p:spPr>
+            <a:xfrm>
+              <a:off x="6094617" y="4965056"/>
+              <a:ext cx="236048" cy="173380"/>
+            </a:xfrm>
+            <a:prstGeom prst="flowChartDecision">
+              <a:avLst/>
+            </a:prstGeom>
+            <a:noFill/>
+            <a:ln w="19050">
+              <a:solidFill>
+                <a:srgbClr val="7030A0"/>
+              </a:solidFill>
+            </a:ln>
+            <a:effectLst/>
+          </p:spPr>
+          <p:style>
+            <a:lnRef idx="1">
+              <a:schemeClr val="accent6"/>
+            </a:lnRef>
+            <a:fillRef idx="2">
+              <a:schemeClr val="accent6"/>
+            </a:fillRef>
+            <a:effectRef idx="1">
+              <a:schemeClr val="accent6"/>
+            </a:effectRef>
+            <a:fontRef idx="minor">
+              <a:schemeClr val="dk1"/>
+            </a:fontRef>
+          </p:style>
+          <p:txBody>
+            <a:bodyPr rtlCol="0" anchor="ctr"/>
+            <a:lstStyle/>
+            <a:p>
+              <a:pPr algn="ctr"/>
+              <a:endParaRPr lang="en-US" sz="1050"/>
+            </a:p>
+          </p:txBody>
+        </p:sp>
+        <p:cxnSp>
+          <p:nvCxnSpPr>
+            <p:cNvPr id="123" name="Elbow Connector 122"/>
+            <p:cNvCxnSpPr/>
+            <p:nvPr/>
+          </p:nvCxnSpPr>
+          <p:spPr>
+            <a:xfrm>
+              <a:off x="6330665" y="5051746"/>
+              <a:ext cx="218878" cy="3080"/>
+            </a:xfrm>
+            <a:prstGeom prst="bentConnector3">
+              <a:avLst/>
+            </a:prstGeom>
+            <a:ln w="19050">
+              <a:solidFill>
+                <a:srgbClr val="7030A0"/>
+              </a:solidFill>
+              <a:headEnd type="none" w="med" len="med"/>
+              <a:tailEnd type="arrow" w="med" len="med"/>
+            </a:ln>
+            <a:effectLst/>
+          </p:spPr>
+          <p:style>
+            <a:lnRef idx="1">
+              <a:schemeClr val="accent2"/>
+            </a:lnRef>
+            <a:fillRef idx="2">
+              <a:schemeClr val="accent2"/>
+            </a:fillRef>
+            <a:effectRef idx="1">
+              <a:schemeClr val="accent2"/>
+            </a:effectRef>
+            <a:fontRef idx="minor">
+              <a:schemeClr val="dk1"/>
+            </a:fontRef>
+          </p:style>
+        </p:cxnSp>
+      </p:grpSp>
+      <p:sp>
+        <p:nvSpPr>
+          <p:cNvPr id="125" name="TextBox 124"/>
+          <p:cNvSpPr txBox="1"/>
+          <p:nvPr/>
+        </p:nvSpPr>
+        <p:spPr>
+          <a:xfrm>
+            <a:off x="3837905" y="4001282"/>
+            <a:ext cx="189257" cy="178683"/>
+          </a:xfrm>
+          <a:prstGeom prst="rect">
+            <a:avLst/>
+          </a:prstGeom>
+          <a:noFill/>
+        </p:spPr>
+        <p:txBody>
+          <a:bodyPr wrap="square" lIns="0" tIns="0" rIns="0" bIns="0" rtlCol="0">
+            <a:noAutofit/>
+          </a:bodyPr>
+          <a:lstStyle/>
+          <a:p>
+            <a:pPr algn="ctr"/>
+            <a:r>
+              <a:rPr lang="en-US" sz="1100" dirty="0">
+                <a:solidFill>
+                  <a:srgbClr val="7030A0"/>
+                </a:solidFill>
+              </a:rPr>
+              <a:t>1</a:t>
+            </a:r>
+            <a:endParaRPr lang="en-SG" sz="1100" dirty="0">
+              <a:solidFill>
+                <a:srgbClr val="7030A0"/>
+              </a:solidFill>
+            </a:endParaRPr>
+          </a:p>
+        </p:txBody>
+      </p:sp>
+      <p:sp>
+        <p:nvSpPr>
+          <p:cNvPr id="126" name="TextBox 125"/>
+          <p:cNvSpPr txBox="1"/>
+          <p:nvPr/>
+        </p:nvSpPr>
+        <p:spPr>
+          <a:xfrm>
+            <a:off x="5799281" y="3984604"/>
+            <a:ext cx="189257" cy="178683"/>
+          </a:xfrm>
+          <a:prstGeom prst="rect">
+            <a:avLst/>
+          </a:prstGeom>
+          <a:noFill/>
+        </p:spPr>
+        <p:txBody>
+          <a:bodyPr wrap="square" lIns="0" tIns="0" rIns="0" bIns="0" rtlCol="0">
+            <a:noAutofit/>
+          </a:bodyPr>
+          <a:lstStyle/>
+          <a:p>
+            <a:pPr algn="ctr"/>
+            <a:r>
+              <a:rPr lang="en-US" sz="1100" dirty="0">
+                <a:solidFill>
+                  <a:srgbClr val="7030A0"/>
+                </a:solidFill>
+              </a:rPr>
+              <a:t>*</a:t>
+            </a:r>
+            <a:endParaRPr lang="en-SG" sz="1100" dirty="0">
+              <a:solidFill>
+                <a:srgbClr val="7030A0"/>
+              </a:solidFill>
+            </a:endParaRPr>
+          </a:p>
+        </p:txBody>
+      </p:sp>
+      <p:grpSp>
+        <p:nvGrpSpPr>
+          <p:cNvPr id="44" name="Group 43"/>
+          <p:cNvGrpSpPr/>
+          <p:nvPr/>
+        </p:nvGrpSpPr>
+        <p:grpSpPr>
+          <a:xfrm>
+            <a:off x="3733808" y="3831450"/>
+            <a:ext cx="367678" cy="173380"/>
+            <a:chOff x="4560838" y="4943912"/>
+            <a:chExt cx="367678" cy="173380"/>
+          </a:xfrm>
+        </p:grpSpPr>
+        <p:sp>
+          <p:nvSpPr>
+            <p:cNvPr id="117" name="Flowchart: Decision 96"/>
+            <p:cNvSpPr/>
+            <p:nvPr/>
+          </p:nvSpPr>
+          <p:spPr>
+            <a:xfrm>
+              <a:off x="4560838" y="4943912"/>
+              <a:ext cx="236048" cy="173380"/>
+            </a:xfrm>
+            <a:prstGeom prst="flowChartDecision">
+              <a:avLst/>
+            </a:prstGeom>
+            <a:solidFill>
+              <a:srgbClr val="7030A0"/>
+            </a:solidFill>
+            <a:ln w="19050">
+              <a:solidFill>
+                <a:srgbClr val="7030A0"/>
+              </a:solidFill>
+            </a:ln>
+            <a:effectLst/>
+          </p:spPr>
+          <p:style>
+            <a:lnRef idx="1">
+              <a:schemeClr val="accent6"/>
+            </a:lnRef>
+            <a:fillRef idx="2">
+              <a:schemeClr val="accent6"/>
+            </a:fillRef>
+            <a:effectRef idx="1">
+              <a:schemeClr val="accent6"/>
+            </a:effectRef>
+            <a:fontRef idx="minor">
+              <a:schemeClr val="dk1"/>
+            </a:fontRef>
+          </p:style>
+          <p:txBody>
+            <a:bodyPr rtlCol="0" anchor="ctr"/>
+            <a:lstStyle/>
+            <a:p>
+              <a:pPr algn="ctr"/>
+              <a:endParaRPr lang="en-US" sz="1050"/>
+            </a:p>
+          </p:txBody>
+        </p:sp>
+        <p:cxnSp>
+          <p:nvCxnSpPr>
+            <p:cNvPr id="127" name="Straight Arrow Connector 126"/>
+            <p:cNvCxnSpPr/>
+            <p:nvPr/>
+          </p:nvCxnSpPr>
+          <p:spPr>
+            <a:xfrm>
+              <a:off x="4560838" y="5030602"/>
+              <a:ext cx="367678" cy="12320"/>
+            </a:xfrm>
+            <a:prstGeom prst="straightConnector1">
+              <a:avLst/>
+            </a:prstGeom>
+            <a:ln w="19050">
+              <a:solidFill>
+                <a:srgbClr val="7030A0"/>
+              </a:solidFill>
+              <a:headEnd type="none" w="med" len="med"/>
+              <a:tailEnd type="arrow" w="med" len="med"/>
+            </a:ln>
+            <a:effectLst/>
+          </p:spPr>
+          <p:style>
+            <a:lnRef idx="1">
+              <a:schemeClr val="accent2"/>
+            </a:lnRef>
+            <a:fillRef idx="2">
+              <a:schemeClr val="accent2"/>
+            </a:fillRef>
+            <a:effectRef idx="1">
+              <a:schemeClr val="accent2"/>
+            </a:effectRef>
+            <a:fontRef idx="minor">
+              <a:schemeClr val="dk1"/>
+            </a:fontRef>
+          </p:style>
+        </p:cxnSp>
+      </p:grpSp>
+      <p:sp>
+        <p:nvSpPr>
+          <p:cNvPr id="128" name="Rectangle 8"/>
+          <p:cNvSpPr/>
+          <p:nvPr/>
+        </p:nvSpPr>
+        <p:spPr>
+          <a:xfrm>
+            <a:off x="6083707" y="3750920"/>
+            <a:ext cx="918057" cy="346760"/>
+          </a:xfrm>
+          <a:prstGeom prst="rect">
+            <a:avLst/>
+          </a:prstGeom>
+          <a:ln w="19050">
+            <a:solidFill>
+              <a:srgbClr val="7030A0"/>
+            </a:solidFill>
+          </a:ln>
+          <a:effectLst/>
+        </p:spPr>
+        <p:style>
+          <a:lnRef idx="1">
+            <a:schemeClr val="accent4"/>
+          </a:lnRef>
+          <a:fillRef idx="2">
+            <a:schemeClr val="accent4"/>
+          </a:fillRef>
+          <a:effectRef idx="1">
+            <a:schemeClr val="accent4"/>
+          </a:effectRef>
+          <a:fontRef idx="minor">
+            <a:schemeClr val="dk1"/>
+          </a:fontRef>
+        </p:style>
+        <p:txBody>
+          <a:bodyPr rtlCol="0" anchor="ctr"/>
+          <a:lstStyle/>
+          <a:p>
+            <a:pPr algn="ctr"/>
+            <a:r>
+              <a:rPr lang="en-US" sz="1050" smtClean="0">
+                <a:solidFill>
+                  <a:srgbClr val="7030A0"/>
+                </a:solidFill>
+              </a:rPr>
+              <a:t>Deliveryman</a:t>
+            </a:r>
+            <a:endParaRPr lang="en-SG" sz="1050" dirty="0">
+              <a:solidFill>
+                <a:srgbClr val="7030A0"/>
+              </a:solidFill>
+            </a:endParaRPr>
+          </a:p>
+        </p:txBody>
+      </p:sp>
+      <p:sp>
+        <p:nvSpPr>
+          <p:cNvPr id="129" name="Flowchart: Decision 96"/>
+          <p:cNvSpPr/>
+          <p:nvPr/>
+        </p:nvSpPr>
+        <p:spPr>
+          <a:xfrm>
+            <a:off x="7020439" y="3849145"/>
+            <a:ext cx="236048" cy="173380"/>
+          </a:xfrm>
+          <a:prstGeom prst="flowChartDecision">
+            <a:avLst/>
           </a:prstGeom>
           <a:solidFill>
-            <a:schemeClr val="accent4">
-              <a:lumMod val="20000"/>
-              <a:lumOff val="80000"/>
-            </a:schemeClr>
+            <a:srgbClr val="7030A0"/>
           </a:solidFill>
           <a:ln w="19050">
             <a:solidFill>
@@ -5593,23 +7445,79 @@
           <a:lstStyle/>
           <a:p>
             <a:pPr algn="ctr"/>
-            <a:endParaRPr lang="en-SG" sz="1050"/>
+            <a:endParaRPr lang="en-US" sz="1050"/>
+          </a:p>
+        </p:txBody>
+      </p:sp>
+      <p:sp>
+        <p:nvSpPr>
+          <p:cNvPr id="130" name="Rectangle 8"/>
+          <p:cNvSpPr/>
+          <p:nvPr/>
+        </p:nvSpPr>
+        <p:spPr>
+          <a:xfrm>
+            <a:off x="7568796" y="3795247"/>
+            <a:ext cx="898202" cy="285783"/>
+          </a:xfrm>
+          <a:prstGeom prst="rect">
+            <a:avLst/>
+          </a:prstGeom>
+          <a:ln w="19050">
+            <a:solidFill>
+              <a:srgbClr val="7030A0"/>
+            </a:solidFill>
+          </a:ln>
+          <a:effectLst/>
+        </p:spPr>
+        <p:style>
+          <a:lnRef idx="1">
+            <a:schemeClr val="accent4"/>
+          </a:lnRef>
+          <a:fillRef idx="2">
+            <a:schemeClr val="accent4"/>
+          </a:fillRef>
+          <a:effectRef idx="1">
+            <a:schemeClr val="accent4"/>
+          </a:effectRef>
+          <a:fontRef idx="minor">
+            <a:schemeClr val="dk1"/>
+          </a:fontRef>
+        </p:style>
+        <p:txBody>
+          <a:bodyPr rtlCol="0" anchor="ctr"/>
+          <a:lstStyle/>
+          <a:p>
+            <a:pPr algn="ctr"/>
+            <a:r>
+              <a:rPr lang="en-US" sz="1050" dirty="0" smtClean="0">
+                <a:solidFill>
+                  <a:srgbClr val="7030A0"/>
+                </a:solidFill>
+              </a:rPr>
+              <a:t>Name</a:t>
+            </a:r>
+            <a:endParaRPr lang="en-SG" sz="1050" dirty="0">
+              <a:solidFill>
+                <a:srgbClr val="7030A0"/>
+              </a:solidFill>
+            </a:endParaRPr>
           </a:p>
         </p:txBody>
       </p:sp>
       <p:cxnSp>
         <p:nvCxnSpPr>
-          <p:cNvPr id="69" name="Elbow Connector 63"/>
+          <p:cNvPr id="131" name="Elbow Connector 130"/>
           <p:cNvCxnSpPr>
-            <a:stCxn id="68" idx="3"/>
-            <a:endCxn id="55" idx="1"/>
+            <a:stCxn id="129" idx="3"/>
+            <a:endCxn id="130" idx="1"/>
           </p:cNvCxnSpPr>
           <p:nvPr/>
         </p:nvCxnSpPr>
         <p:spPr>
           <a:xfrm>
-            <a:off x="2898289" y="2177727"/>
-            <a:ext cx="271892" cy="2821"/>
+            <a:off x="7256487" y="3935835"/>
+            <a:ext cx="312309" cy="2304"/>
           </a:xfrm>
           <a:prstGeom prst="bentConnector3">
             <a:avLst>
@@ -5620,9 +7528,8 @@
             <a:solidFill>
               <a:srgbClr val="7030A0"/>
             </a:solidFill>
-            <a:prstDash val="sysDot"/>
             <a:headEnd type="none" w="med" len="med"/>
-            <a:tailEnd type="none" w="med" len="med"/>
+            <a:tailEnd type="arrow" w="med" len="med"/>
           </a:ln>
           <a:effectLst/>
         </p:spPr>
@@ -5641,6 +7548,441 @@
           </a:fontRef>
         </p:style>
       </p:cxnSp>
+      <p:cxnSp>
+        <p:nvCxnSpPr>
+          <p:cNvPr id="150" name="Elbow Connector 149"/>
+          <p:cNvCxnSpPr>
+            <a:cxnSpLocks/>
+          </p:cNvCxnSpPr>
+          <p:nvPr/>
+        </p:nvCxnSpPr>
+        <p:spPr>
+          <a:xfrm flipV="1">
+            <a:off x="1519823" y="2971332"/>
+            <a:ext cx="4279458" cy="178683"/>
+          </a:xfrm>
+          <a:prstGeom prst="bentConnector2">
+            <a:avLst/>
+          </a:prstGeom>
+          <a:ln w="19050">
+            <a:solidFill>
+              <a:srgbClr val="7030A0"/>
+            </a:solidFill>
+            <a:prstDash val="solid"/>
+            <a:headEnd type="none" w="med" len="med"/>
+            <a:tailEnd type="arrow" w="med" len="med"/>
+          </a:ln>
+          <a:effectLst/>
+        </p:spPr>
+        <p:style>
+          <a:lnRef idx="1">
+            <a:schemeClr val="accent2"/>
+          </a:lnRef>
+          <a:fillRef idx="2">
+            <a:schemeClr val="accent2"/>
+          </a:fillRef>
+          <a:effectRef idx="1">
+            <a:schemeClr val="accent2"/>
+          </a:effectRef>
+          <a:fontRef idx="minor">
+            <a:schemeClr val="dk1"/>
+          </a:fontRef>
+        </p:style>
+      </p:cxnSp>
+      <p:sp>
+        <p:nvSpPr>
+          <p:cNvPr id="151" name="TextBox 150"/>
+          <p:cNvSpPr txBox="1"/>
+          <p:nvPr/>
+        </p:nvSpPr>
+        <p:spPr>
+          <a:xfrm>
+            <a:off x="4912893" y="3115836"/>
+            <a:ext cx="881018" cy="261610"/>
+          </a:xfrm>
+          <a:prstGeom prst="rect">
+            <a:avLst/>
+          </a:prstGeom>
+          <a:noFill/>
+        </p:spPr>
+        <p:txBody>
+          <a:bodyPr wrap="square" rtlCol="0">
+            <a:spAutoFit/>
+          </a:bodyPr>
+          <a:lstStyle/>
+          <a:p>
+            <a:pPr algn="r"/>
+            <a:r>
+              <a:rPr lang="en-US" sz="1100" dirty="0">
+                <a:solidFill>
+                  <a:srgbClr val="7030A0"/>
+                </a:solidFill>
+              </a:rPr>
+              <a:t>filtered list</a:t>
+            </a:r>
+            <a:endParaRPr lang="en-SG" sz="1100" dirty="0">
+              <a:solidFill>
+                <a:srgbClr val="7030A0"/>
+              </a:solidFill>
+            </a:endParaRPr>
+          </a:p>
+        </p:txBody>
+      </p:sp>
+      <p:sp>
+        <p:nvSpPr>
+          <p:cNvPr id="152" name="TextBox 151"/>
+          <p:cNvSpPr txBox="1"/>
+          <p:nvPr/>
+        </p:nvSpPr>
+        <p:spPr>
+          <a:xfrm>
+            <a:off x="5547823" y="2971332"/>
+            <a:ext cx="189257" cy="178683"/>
+          </a:xfrm>
+          <a:prstGeom prst="rect">
+            <a:avLst/>
+          </a:prstGeom>
+          <a:noFill/>
+        </p:spPr>
+        <p:txBody>
+          <a:bodyPr wrap="square" lIns="0" tIns="0" rIns="0" bIns="0" rtlCol="0">
+            <a:noAutofit/>
+          </a:bodyPr>
+          <a:lstStyle/>
+          <a:p>
+            <a:pPr algn="ctr"/>
+            <a:r>
+              <a:rPr lang="en-US" sz="1100" dirty="0">
+                <a:solidFill>
+                  <a:srgbClr val="7030A0"/>
+                </a:solidFill>
+              </a:rPr>
+              <a:t>1</a:t>
+            </a:r>
+            <a:endParaRPr lang="en-SG" sz="1100" dirty="0">
+              <a:solidFill>
+                <a:srgbClr val="7030A0"/>
+              </a:solidFill>
+            </a:endParaRPr>
+          </a:p>
+        </p:txBody>
+      </p:sp>
+      <p:cxnSp>
+        <p:nvCxnSpPr>
+          <p:cNvPr id="159" name="Elbow Connector 158"/>
+          <p:cNvCxnSpPr>
+            <a:cxnSpLocks/>
+            <a:endCxn id="128" idx="2"/>
+          </p:cNvCxnSpPr>
+          <p:nvPr/>
+        </p:nvCxnSpPr>
+        <p:spPr>
+          <a:xfrm flipV="1">
+            <a:off x="1525631" y="4097680"/>
+            <a:ext cx="5017105" cy="224961"/>
+          </a:xfrm>
+          <a:prstGeom prst="bentConnector2">
+            <a:avLst/>
+          </a:prstGeom>
+          <a:ln w="19050">
+            <a:solidFill>
+              <a:srgbClr val="7030A0"/>
+            </a:solidFill>
+            <a:prstDash val="solid"/>
+            <a:headEnd type="none" w="med" len="med"/>
+            <a:tailEnd type="arrow" w="med" len="med"/>
+          </a:ln>
+          <a:effectLst/>
+        </p:spPr>
+        <p:style>
+          <a:lnRef idx="1">
+            <a:schemeClr val="accent2"/>
+          </a:lnRef>
+          <a:fillRef idx="2">
+            <a:schemeClr val="accent2"/>
+          </a:fillRef>
+          <a:effectRef idx="1">
+            <a:schemeClr val="accent2"/>
+          </a:effectRef>
+          <a:fontRef idx="minor">
+            <a:schemeClr val="dk1"/>
+          </a:fontRef>
+        </p:style>
+      </p:cxnSp>
+      <p:sp>
+        <p:nvSpPr>
+          <p:cNvPr id="160" name="TextBox 159"/>
+          <p:cNvSpPr txBox="1"/>
+          <p:nvPr/>
+        </p:nvSpPr>
+        <p:spPr>
+          <a:xfrm>
+            <a:off x="5672182" y="4288461"/>
+            <a:ext cx="881018" cy="261610"/>
+          </a:xfrm>
+          <a:prstGeom prst="rect">
+            <a:avLst/>
+          </a:prstGeom>
+          <a:noFill/>
+        </p:spPr>
+        <p:txBody>
+          <a:bodyPr wrap="square" rtlCol="0">
+            <a:spAutoFit/>
+          </a:bodyPr>
+          <a:lstStyle/>
+          <a:p>
+            <a:pPr algn="r"/>
+            <a:r>
+              <a:rPr lang="en-US" sz="1100" dirty="0">
+                <a:solidFill>
+                  <a:srgbClr val="7030A0"/>
+                </a:solidFill>
+              </a:rPr>
+              <a:t>filtered list</a:t>
+            </a:r>
+            <a:endParaRPr lang="en-SG" sz="1100" dirty="0">
+              <a:solidFill>
+                <a:srgbClr val="7030A0"/>
+              </a:solidFill>
+            </a:endParaRPr>
+          </a:p>
+        </p:txBody>
+      </p:sp>
+      <p:sp>
+        <p:nvSpPr>
+          <p:cNvPr id="161" name="TextBox 160"/>
+          <p:cNvSpPr txBox="1"/>
+          <p:nvPr/>
+        </p:nvSpPr>
+        <p:spPr>
+          <a:xfrm>
+            <a:off x="6287743" y="4143957"/>
+            <a:ext cx="189257" cy="178683"/>
+          </a:xfrm>
+          <a:prstGeom prst="rect">
+            <a:avLst/>
+          </a:prstGeom>
+          <a:noFill/>
+        </p:spPr>
+        <p:txBody>
+          <a:bodyPr wrap="square" lIns="0" tIns="0" rIns="0" bIns="0" rtlCol="0">
+            <a:noAutofit/>
+          </a:bodyPr>
+          <a:lstStyle/>
+          <a:p>
+            <a:pPr algn="ctr"/>
+            <a:r>
+              <a:rPr lang="en-US" sz="1100" dirty="0">
+                <a:solidFill>
+                  <a:srgbClr val="7030A0"/>
+                </a:solidFill>
+              </a:rPr>
+              <a:t>1</a:t>
+            </a:r>
+            <a:endParaRPr lang="en-SG" sz="1100" dirty="0">
+              <a:solidFill>
+                <a:srgbClr val="7030A0"/>
+              </a:solidFill>
+            </a:endParaRPr>
+          </a:p>
+        </p:txBody>
+      </p:sp>
+      <p:sp>
+        <p:nvSpPr>
+          <p:cNvPr id="164" name="Rectangle 8"/>
+          <p:cNvSpPr/>
+          <p:nvPr/>
+        </p:nvSpPr>
+        <p:spPr>
+          <a:xfrm>
+            <a:off x="2021108" y="5152308"/>
+            <a:ext cx="1093635" cy="346760"/>
+          </a:xfrm>
+          <a:prstGeom prst="rect">
+            <a:avLst/>
+          </a:prstGeom>
+          <a:solidFill>
+            <a:srgbClr val="7030A0"/>
+          </a:solidFill>
+          <a:ln w="19050">
+            <a:solidFill>
+              <a:srgbClr val="7030A0"/>
+            </a:solidFill>
+          </a:ln>
+          <a:effectLst/>
+        </p:spPr>
+        <p:style>
+          <a:lnRef idx="1">
+            <a:schemeClr val="accent2"/>
+          </a:lnRef>
+          <a:fillRef idx="2">
+            <a:schemeClr val="accent2"/>
+          </a:fillRef>
+          <a:effectRef idx="1">
+            <a:schemeClr val="accent2"/>
+          </a:effectRef>
+          <a:fontRef idx="minor">
+            <a:schemeClr val="dk1"/>
+          </a:fontRef>
+        </p:style>
+        <p:txBody>
+          <a:bodyPr rtlCol="0" anchor="ctr"/>
+          <a:lstStyle/>
+          <a:p>
+            <a:pPr algn="ctr"/>
+            <a:r>
+              <a:rPr lang="en-US" sz="1050" dirty="0" err="1" smtClean="0">
+                <a:solidFill>
+                  <a:schemeClr val="bg1"/>
+                </a:solidFill>
+              </a:rPr>
+              <a:t>UserSession</a:t>
+            </a:r>
+            <a:endParaRPr lang="en-SG" sz="1050" dirty="0">
+              <a:solidFill>
+                <a:schemeClr val="bg1"/>
+              </a:solidFill>
+            </a:endParaRPr>
+          </a:p>
+        </p:txBody>
+      </p:sp>
+      <p:grpSp>
+        <p:nvGrpSpPr>
+          <p:cNvPr id="171" name="Group 170"/>
+          <p:cNvGrpSpPr/>
+          <p:nvPr/>
+        </p:nvGrpSpPr>
+        <p:grpSpPr>
+          <a:xfrm>
+            <a:off x="1561282" y="5211169"/>
+            <a:ext cx="436968" cy="173380"/>
+            <a:chOff x="2388312" y="4956232"/>
+            <a:chExt cx="436968" cy="173380"/>
+          </a:xfrm>
+        </p:grpSpPr>
+        <p:cxnSp>
+          <p:nvCxnSpPr>
+            <p:cNvPr id="172" name="Straight Arrow Connector 171"/>
+            <p:cNvCxnSpPr/>
+            <p:nvPr/>
+          </p:nvCxnSpPr>
+          <p:spPr>
+            <a:xfrm>
+              <a:off x="2624360" y="5042922"/>
+              <a:ext cx="200920" cy="10557"/>
+            </a:xfrm>
+            <a:prstGeom prst="straightConnector1">
+              <a:avLst/>
+            </a:prstGeom>
+            <a:ln w="19050">
+              <a:solidFill>
+                <a:srgbClr val="7030A0"/>
+              </a:solidFill>
+              <a:headEnd type="none" w="med" len="med"/>
+              <a:tailEnd type="arrow" w="med" len="med"/>
+            </a:ln>
+            <a:effectLst/>
+          </p:spPr>
+          <p:style>
+            <a:lnRef idx="1">
+              <a:schemeClr val="accent2"/>
+            </a:lnRef>
+            <a:fillRef idx="2">
+              <a:schemeClr val="accent2"/>
+            </a:fillRef>
+            <a:effectRef idx="1">
+              <a:schemeClr val="accent2"/>
+            </a:effectRef>
+            <a:fontRef idx="minor">
+              <a:schemeClr val="dk1"/>
+            </a:fontRef>
+          </p:style>
+        </p:cxnSp>
+        <p:sp>
+          <p:nvSpPr>
+            <p:cNvPr id="173" name="Flowchart: Decision 96"/>
+            <p:cNvSpPr/>
+            <p:nvPr/>
+          </p:nvSpPr>
+          <p:spPr>
+            <a:xfrm>
+              <a:off x="2388312" y="4956232"/>
+              <a:ext cx="236048" cy="173380"/>
+            </a:xfrm>
+            <a:prstGeom prst="flowChartDecision">
+              <a:avLst/>
+            </a:prstGeom>
+            <a:noFill/>
+            <a:ln w="19050">
+              <a:solidFill>
+                <a:srgbClr val="7030A0"/>
+              </a:solidFill>
+            </a:ln>
+            <a:effectLst/>
+          </p:spPr>
+          <p:style>
+            <a:lnRef idx="1">
+              <a:schemeClr val="accent6"/>
+            </a:lnRef>
+            <a:fillRef idx="2">
+              <a:schemeClr val="accent6"/>
+            </a:fillRef>
+            <a:effectRef idx="1">
+              <a:schemeClr val="accent6"/>
+            </a:effectRef>
+            <a:fontRef idx="minor">
+              <a:schemeClr val="dk1"/>
+            </a:fontRef>
+          </p:style>
+          <p:txBody>
+            <a:bodyPr rtlCol="0" anchor="ctr"/>
+            <a:lstStyle/>
+            <a:p>
+              <a:pPr algn="ctr"/>
+              <a:endParaRPr lang="en-US" sz="1050"/>
+            </a:p>
+          </p:txBody>
+        </p:sp>
+      </p:grpSp>
+      <p:sp>
+        <p:nvSpPr>
+          <p:cNvPr id="174" name="TextBox 173"/>
+          <p:cNvSpPr txBox="1"/>
+          <p:nvPr/>
+        </p:nvSpPr>
+        <p:spPr>
+          <a:xfrm>
+            <a:off x="1729867" y="5112908"/>
+            <a:ext cx="189257" cy="178683"/>
+          </a:xfrm>
+          <a:prstGeom prst="rect">
+            <a:avLst/>
+          </a:prstGeom>
+          <a:noFill/>
+        </p:spPr>
+        <p:txBody>
+          <a:bodyPr wrap="square" lIns="0" tIns="0" rIns="0" bIns="0" rtlCol="0">
+            <a:noAutofit/>
+          </a:bodyPr>
+          <a:lstStyle/>
+          <a:p>
+            <a:pPr algn="ctr"/>
+            <a:r>
+              <a:rPr lang="en-US" sz="1100" dirty="0">
+                <a:solidFill>
+                  <a:srgbClr val="7030A0"/>
+                </a:solidFill>
+              </a:rPr>
+              <a:t>1</a:t>
+            </a:r>
+            <a:endParaRPr lang="en-SG" sz="1100" dirty="0">
+              <a:solidFill>
+                <a:srgbClr val="7030A0"/>
+              </a:solidFill>
+            </a:endParaRPr>
+          </a:p>
+        </p:txBody>
+      </p:sp>
     </p:spTree>
     <p:extLst>
       <p:ext uri="{BB962C8B-B14F-4D97-AF65-F5344CB8AC3E}">

</xml_diff>